<commit_message>
Data upload and change of name
</commit_message>
<xml_diff>
--- a/Autobahn.pptx
+++ b/Autobahn.pptx
@@ -1,22 +1,23 @@
 
 <file path=ppt/presentation.xml><?xml version="1.0" encoding="utf-8"?>
-<p:presentation xmlns:r="http://schemas.openxmlformats.org/officeDocument/2006/relationships" xmlns:c="http://schemas.openxmlformats.org/drawingml/2006/chart" xmlns:a="http://schemas.openxmlformats.org/drawingml/2006/main" xmlns:dgm="http://schemas.openxmlformats.org/drawingml/2006/diagram" xmlns:dsp="http://schemas.microsoft.com/office/drawing/2008/diagram" xmlns:p="http://schemas.openxmlformats.org/presentationml/2006/main">
+<p:presentation xmlns:a="http://schemas.openxmlformats.org/drawingml/2006/main" xmlns:r="http://schemas.openxmlformats.org/officeDocument/2006/relationships" xmlns:p="http://schemas.openxmlformats.org/presentationml/2006/main">
   <p:sldMasterIdLst>
     <p:sldMasterId id="2147483729" r:id="rId1"/>
   </p:sldMasterIdLst>
   <p:notesMasterIdLst>
-    <p:notesMasterId r:id="rId2"/>
+    <p:notesMasterId r:id="rId12"/>
   </p:notesMasterIdLst>
   <p:sldIdLst>
-    <p:sldId id="256" r:id="rId3"/>
-    <p:sldId id="257" r:id="rId4"/>
-    <p:sldId id="258" r:id="rId5"/>
-    <p:sldId id="259" r:id="rId6"/>
-    <p:sldId id="260" r:id="rId7"/>
-    <p:sldId id="261" r:id="rId8"/>
-    <p:sldId id="262" r:id="rId9"/>
-    <p:sldId id="263" r:id="rId10"/>
-    <p:sldId id="264" r:id="rId11"/>
+    <p:sldId id="256" r:id="rId2"/>
+    <p:sldId id="257" r:id="rId3"/>
+    <p:sldId id="258" r:id="rId4"/>
+    <p:sldId id="259" r:id="rId5"/>
+    <p:sldId id="260" r:id="rId6"/>
+    <p:sldId id="261" r:id="rId7"/>
+    <p:sldId id="262" r:id="rId8"/>
+    <p:sldId id="263" r:id="rId9"/>
+    <p:sldId id="264" r:id="rId10"/>
+    <p:sldId id="265" r:id="rId11"/>
   </p:sldIdLst>
   <p:sldSz cx="12192000" cy="6858000"/>
   <p:notesSz cx="6858000" cy="9144000"/>
@@ -115,11 +116,79 @@
       </a:defRPr>
     </a:lvl9pPr>
   </p:defaultTextStyle>
+  <p:extLst>
+    <p:ext uri="{EFAFB233-063F-42B5-8137-9DF3F51BA10A}">
+      <p15:sldGuideLst xmlns:p15="http://schemas.microsoft.com/office/powerpoint/2012/main">
+        <p15:guide id="1" orient="horz" pos="2159">
+          <p15:clr>
+            <a:srgbClr val="A4A3A4"/>
+          </p15:clr>
+        </p15:guide>
+        <p15:guide id="2" pos="3839">
+          <p15:clr>
+            <a:srgbClr val="A4A3A4"/>
+          </p15:clr>
+        </p15:guide>
+      </p15:sldGuideLst>
+    </p:ext>
+  </p:extLst>
 </p:presentation>
 </file>
 
+<file path=ppt/revisionInfo.xml><?xml version="1.0" encoding="utf-8"?>
+<p1510:revInfo xmlns:a="http://schemas.openxmlformats.org/drawingml/2006/main" xmlns:r="http://schemas.openxmlformats.org/officeDocument/2006/relationships" xmlns:p1510="http://schemas.microsoft.com/office/powerpoint/2015/10/main">
+  <p1510:revLst>
+    <p1510:client id="{848C9A90-44B3-457C-9FF0-F6AA77450BE6}" v="3" dt="2022-11-27T14:33:38.927"/>
+  </p1510:revLst>
+</p1510:revInfo>
+</file>
+
+<file path=ppt/changesInfos/changesInfo1.xml><?xml version="1.0" encoding="utf-8"?>
+<pc:chgInfo xmlns:a="http://schemas.openxmlformats.org/drawingml/2006/main" xmlns:r="http://schemas.openxmlformats.org/officeDocument/2006/relationships" xmlns:ac="http://schemas.microsoft.com/office/drawing/2013/main/command" xmlns:pc="http://schemas.microsoft.com/office/powerpoint/2013/main/command">
+  <pc:docChgLst>
+    <pc:chgData name="Lee JooHyun" userId="66a2766f3c634696" providerId="LiveId" clId="{848C9A90-44B3-457C-9FF0-F6AA77450BE6}"/>
+    <pc:docChg chg="custSel addSld modSld">
+      <pc:chgData name="Lee JooHyun" userId="66a2766f3c634696" providerId="LiveId" clId="{848C9A90-44B3-457C-9FF0-F6AA77450BE6}" dt="2022-11-27T14:33:38.927" v="54"/>
+      <pc:docMkLst>
+        <pc:docMk/>
+      </pc:docMkLst>
+      <pc:sldChg chg="modSp mod">
+        <pc:chgData name="Lee JooHyun" userId="66a2766f3c634696" providerId="LiveId" clId="{848C9A90-44B3-457C-9FF0-F6AA77450BE6}" dt="2022-11-27T14:33:30.626" v="12" actId="27636"/>
+        <pc:sldMkLst>
+          <pc:docMk/>
+          <pc:sldMk cId="0" sldId="258"/>
+        </pc:sldMkLst>
+        <pc:spChg chg="mod">
+          <ac:chgData name="Lee JooHyun" userId="66a2766f3c634696" providerId="LiveId" clId="{848C9A90-44B3-457C-9FF0-F6AA77450BE6}" dt="2022-11-27T14:33:30.626" v="12" actId="27636"/>
+          <ac:spMkLst>
+            <pc:docMk/>
+            <pc:sldMk cId="0" sldId="258"/>
+            <ac:spMk id="3" creationId="{00000000-0000-0000-0000-000000000000}"/>
+          </ac:spMkLst>
+        </pc:spChg>
+      </pc:sldChg>
+      <pc:sldChg chg="modSp new mod">
+        <pc:chgData name="Lee JooHyun" userId="66a2766f3c634696" providerId="LiveId" clId="{848C9A90-44B3-457C-9FF0-F6AA77450BE6}" dt="2022-11-27T14:33:38.927" v="54"/>
+        <pc:sldMkLst>
+          <pc:docMk/>
+          <pc:sldMk cId="578261484" sldId="265"/>
+        </pc:sldMkLst>
+        <pc:spChg chg="mod">
+          <ac:chgData name="Lee JooHyun" userId="66a2766f3c634696" providerId="LiveId" clId="{848C9A90-44B3-457C-9FF0-F6AA77450BE6}" dt="2022-11-27T14:33:38.927" v="54"/>
+          <ac:spMkLst>
+            <pc:docMk/>
+            <pc:sldMk cId="578261484" sldId="265"/>
+            <ac:spMk id="2" creationId="{449FA6A7-7858-C11A-7C0F-99E1BF036A0E}"/>
+          </ac:spMkLst>
+        </pc:spChg>
+      </pc:sldChg>
+    </pc:docChg>
+  </pc:docChgLst>
+</pc:chgInfo>
+</file>
+
 <file path=ppt/notesMasters/notesMaster1.xml><?xml version="1.0" encoding="utf-8"?>
-<p:notesMaster xmlns:r="http://schemas.openxmlformats.org/officeDocument/2006/relationships" xmlns:c="http://schemas.openxmlformats.org/drawingml/2006/chart" xmlns:a="http://schemas.openxmlformats.org/drawingml/2006/main" xmlns:dgm="http://schemas.openxmlformats.org/drawingml/2006/diagram" xmlns:dsp="http://schemas.microsoft.com/office/drawing/2008/diagram" xmlns:p="http://schemas.openxmlformats.org/presentationml/2006/main">
+<p:notesMaster xmlns:a="http://schemas.openxmlformats.org/drawingml/2006/main" xmlns:r="http://schemas.openxmlformats.org/officeDocument/2006/relationships" xmlns:p="http://schemas.openxmlformats.org/presentationml/2006/main">
   <p:cSld>
     <p:bg>
       <p:bgRef idx="1001">
@@ -147,7 +216,7 @@
             <a:spLocks noGrp="1"/>
           </p:cNvSpPr>
           <p:nvPr>
-            <p:ph type="hdr" sz="quarter" idx="0"/>
+            <p:ph type="hdr" sz="quarter"/>
           </p:nvPr>
         </p:nvSpPr>
         <p:spPr>
@@ -170,10 +239,6 @@
             <a:pPr lvl="0">
               <a:defRPr/>
             </a:pPr>
-            <a:r>
-              <a:rPr lang="ko-KR" altLang="en-US"/>
-              <a:t/>
-            </a:r>
             <a:endParaRPr lang="ko-KR" altLang="en-US"/>
           </a:p>
         </p:txBody>
@@ -213,7 +278,7 @@
               <a:pPr lvl="0">
                 <a:defRPr/>
               </a:pPr>
-              <a:t>2022-11-22</a:t>
+              <a:t>2022-11-27</a:t>
             </a:fld>
             <a:endParaRPr lang="ko-KR" altLang="en-US"/>
           </a:p>
@@ -287,7 +352,6 @@
               <a:rPr lang="ko-KR" altLang="en-US"/>
               <a:t>마스터 텍스트 스타일을 편집합니다</a:t>
             </a:r>
-            <a:endParaRPr lang="ko-KR" altLang="en-US"/>
           </a:p>
           <a:p>
             <a:pPr lvl="1">
@@ -297,7 +361,6 @@
               <a:rPr lang="ko-KR" altLang="en-US"/>
               <a:t>둘째 수준</a:t>
             </a:r>
-            <a:endParaRPr lang="ko-KR" altLang="en-US"/>
           </a:p>
           <a:p>
             <a:pPr lvl="2">
@@ -307,7 +370,6 @@
               <a:rPr lang="ko-KR" altLang="en-US"/>
               <a:t>셋째 수준</a:t>
             </a:r>
-            <a:endParaRPr lang="ko-KR" altLang="en-US"/>
           </a:p>
           <a:p>
             <a:pPr lvl="3">
@@ -317,7 +379,6 @@
               <a:rPr lang="ko-KR" altLang="en-US"/>
               <a:t>넷째 수준</a:t>
             </a:r>
-            <a:endParaRPr lang="ko-KR" altLang="en-US"/>
           </a:p>
           <a:p>
             <a:pPr lvl="4">
@@ -327,7 +388,6 @@
               <a:rPr lang="ko-KR" altLang="en-US"/>
               <a:t>다섯째 수준</a:t>
             </a:r>
-            <a:endParaRPr lang="ko-KR" altLang="en-US"/>
           </a:p>
         </p:txBody>
       </p:sp>
@@ -361,10 +421,6 @@
             <a:pPr lvl="0">
               <a:defRPr/>
             </a:pPr>
-            <a:r>
-              <a:rPr lang="ko-KR" altLang="en-US"/>
-              <a:t/>
-            </a:r>
             <a:endParaRPr lang="ko-KR" altLang="en-US"/>
           </a:p>
         </p:txBody>
@@ -510,7 +566,7 @@
 </file>
 
 <file path=ppt/notesSlides/notesSlide1.xml><?xml version="1.0" encoding="utf-8"?>
-<p:notes xmlns:r="http://schemas.openxmlformats.org/officeDocument/2006/relationships" xmlns:c="http://schemas.openxmlformats.org/drawingml/2006/chart" xmlns:a="http://schemas.openxmlformats.org/drawingml/2006/main" xmlns:dgm="http://schemas.openxmlformats.org/drawingml/2006/diagram" xmlns:dsp="http://schemas.microsoft.com/office/drawing/2008/diagram" xmlns:p="http://schemas.openxmlformats.org/presentationml/2006/main">
+<p:notes xmlns:a="http://schemas.openxmlformats.org/drawingml/2006/main" xmlns:r="http://schemas.openxmlformats.org/officeDocument/2006/relationships" xmlns:p="http://schemas.openxmlformats.org/presentationml/2006/main">
   <p:cSld>
     <p:spTree>
       <p:nvGrpSpPr>
@@ -566,10 +622,6 @@
             <a:pPr>
               <a:defRPr/>
             </a:pPr>
-            <a:r>
-              <a:rPr lang="en-US" altLang="ko-KR"/>
-              <a:t/>
-            </a:r>
             <a:endParaRPr lang="en-US" altLang="ko-KR"/>
           </a:p>
         </p:txBody>
@@ -597,7 +649,7 @@
               <a:pPr lvl="0">
                 <a:defRPr/>
               </a:pPr>
-              <a:t>3</a:t>
+              <a:t>4</a:t>
             </a:fld>
             <a:endParaRPr lang="en-US" altLang="en-US"/>
           </a:p>
@@ -612,7 +664,7 @@
 </file>
 
 <file path=ppt/slideLayouts/slideLayout1.xml><?xml version="1.0" encoding="utf-8"?>
-<p:sldLayout xmlns:r="http://schemas.openxmlformats.org/officeDocument/2006/relationships" xmlns:c="http://schemas.openxmlformats.org/drawingml/2006/chart" xmlns:a="http://schemas.openxmlformats.org/drawingml/2006/main" xmlns:dgm="http://schemas.openxmlformats.org/drawingml/2006/diagram" xmlns:dsp="http://schemas.microsoft.com/office/drawing/2008/diagram" xmlns:p="http://schemas.openxmlformats.org/presentationml/2006/main" showMasterPhAnim="1" type="title" preserve="1">
+<p:sldLayout xmlns:a="http://schemas.openxmlformats.org/drawingml/2006/main" xmlns:r="http://schemas.openxmlformats.org/officeDocument/2006/relationships" xmlns:p="http://schemas.openxmlformats.org/presentationml/2006/main" type="title" preserve="1">
   <p:cSld name="제목 슬라이드">
     <p:spTree>
       <p:nvGrpSpPr>
@@ -635,7 +687,7 @@
             <a:spLocks noGrp="1"/>
           </p:cNvSpPr>
           <p:nvPr>
-            <p:ph type="ctrTitle" idx="0"/>
+            <p:ph type="ctrTitle"/>
           </p:nvPr>
         </p:nvSpPr>
         <p:spPr>
@@ -649,10 +701,9 @@
           <a:lstStyle/>
           <a:p>
             <a:r>
-              <a:rPr lang="ko-KR" altLang="en-US" smtClean="0"/>
+              <a:rPr lang="ko-KR" altLang="en-US"/>
               <a:t>마스터 제목 스타일 편집</a:t>
             </a:r>
-            <a:endParaRPr lang="ko-KR" altLang="en-US"/>
           </a:p>
         </p:txBody>
       </p:sp>
@@ -768,10 +819,9 @@
           </a:lstStyle>
           <a:p>
             <a:r>
-              <a:rPr lang="ko-KR" altLang="en-US" smtClean="0"/>
+              <a:rPr lang="ko-KR" altLang="en-US"/>
               <a:t>마스터 부제목 스타일 편집</a:t>
             </a:r>
-            <a:endParaRPr lang="ko-KR" altLang="en-US"/>
           </a:p>
         </p:txBody>
       </p:sp>
@@ -793,7 +843,7 @@
             <a:fld id="{940A130E-E3B8-4EBE-931F-81B26B8448AA}" type="datetime1">
               <a:rPr lang="ko-KR" altLang="en-US" smtClean="0"/>
               <a:pPr/>
-              <a:t>2009-12-07</a:t>
+              <a:t>2022-11-27</a:t>
             </a:fld>
             <a:endParaRPr lang="ko-KR" altLang="en-US"/>
           </a:p>
@@ -851,7 +901,7 @@
 </file>
 
 <file path=ppt/slideLayouts/slideLayout10.xml><?xml version="1.0" encoding="utf-8"?>
-<p:sldLayout xmlns:r="http://schemas.openxmlformats.org/officeDocument/2006/relationships" xmlns:c="http://schemas.openxmlformats.org/drawingml/2006/chart" xmlns:a="http://schemas.openxmlformats.org/drawingml/2006/main" xmlns:dgm="http://schemas.openxmlformats.org/drawingml/2006/diagram" xmlns:dsp="http://schemas.microsoft.com/office/drawing/2008/diagram" xmlns:p="http://schemas.openxmlformats.org/presentationml/2006/main" showMasterPhAnim="1" type="objOnly" preserve="1">
+<p:sldLayout xmlns:a="http://schemas.openxmlformats.org/drawingml/2006/main" xmlns:r="http://schemas.openxmlformats.org/officeDocument/2006/relationships" xmlns:p="http://schemas.openxmlformats.org/presentationml/2006/main" type="objOnly" preserve="1">
   <p:cSld name="간지">
     <p:spTree>
       <p:nvGrpSpPr>
@@ -874,7 +924,7 @@
             <a:spLocks noGrp="1"/>
           </p:cNvSpPr>
           <p:nvPr>
-            <p:ph type="ctrTitle" idx="0"/>
+            <p:ph type="ctrTitle"/>
           </p:nvPr>
         </p:nvSpPr>
         <p:spPr>
@@ -894,10 +944,9 @@
           </a:lstStyle>
           <a:p>
             <a:r>
-              <a:rPr lang="ko-KR" altLang="en-US" smtClean="0"/>
+              <a:rPr lang="ko-KR" altLang="en-US"/>
               <a:t>마스터 제목 스타일 편집</a:t>
             </a:r>
-            <a:endParaRPr lang="ko-KR" altLang="en-US"/>
           </a:p>
         </p:txBody>
       </p:sp>
@@ -919,7 +968,7 @@
             <a:fld id="{CA348888-F454-4AD2-BA62-3AF29D9807C0}" type="datetime1">
               <a:rPr lang="ko-KR" altLang="en-US" smtClean="0"/>
               <a:pPr/>
-              <a:t>2009-12-07</a:t>
+              <a:t>2022-11-27</a:t>
             </a:fld>
             <a:endParaRPr lang="ko-KR" altLang="en-US"/>
           </a:p>
@@ -977,7 +1026,7 @@
 </file>
 
 <file path=ppt/slideLayouts/slideLayout11.xml><?xml version="1.0" encoding="utf-8"?>
-<p:sldLayout xmlns:r="http://schemas.openxmlformats.org/officeDocument/2006/relationships" xmlns:c="http://schemas.openxmlformats.org/drawingml/2006/chart" xmlns:a="http://schemas.openxmlformats.org/drawingml/2006/main" xmlns:dgm="http://schemas.openxmlformats.org/drawingml/2006/diagram" xmlns:dsp="http://schemas.microsoft.com/office/drawing/2008/diagram" xmlns:p="http://schemas.openxmlformats.org/presentationml/2006/main" showMasterPhAnim="1" type="clipArtAndTx" preserve="1">
+<p:sldLayout xmlns:a="http://schemas.openxmlformats.org/drawingml/2006/main" xmlns:r="http://schemas.openxmlformats.org/officeDocument/2006/relationships" xmlns:p="http://schemas.openxmlformats.org/presentationml/2006/main" type="clipArtAndTx" preserve="1">
   <p:cSld name="목차">
     <p:spTree>
       <p:nvGrpSpPr>
@@ -1000,7 +1049,7 @@
             <a:spLocks noGrp="1"/>
           </p:cNvSpPr>
           <p:nvPr>
-            <p:ph type="title" idx="0"/>
+            <p:ph type="title"/>
           </p:nvPr>
         </p:nvSpPr>
         <p:spPr>
@@ -1018,10 +1067,9 @@
           </a:lstStyle>
           <a:p>
             <a:r>
-              <a:rPr lang="ko-KR" altLang="en-US" smtClean="0"/>
+              <a:rPr lang="ko-KR" altLang="en-US"/>
               <a:t>마스터 제목 스타일 편집</a:t>
             </a:r>
-            <a:endParaRPr lang="ko-KR" altLang="en-US"/>
           </a:p>
         </p:txBody>
       </p:sp>
@@ -1056,42 +1104,37 @@
           <a:p>
             <a:pPr lvl="0"/>
             <a:r>
-              <a:rPr lang="ko-KR" altLang="en-US" smtClean="0"/>
+              <a:rPr lang="ko-KR" altLang="en-US"/>
               <a:t>첫째 목차</a:t>
             </a:r>
-            <a:endParaRPr lang="ko-KR" altLang="en-US"/>
           </a:p>
           <a:p>
             <a:pPr lvl="0"/>
             <a:r>
-              <a:rPr lang="ko-KR" altLang="en-US" smtClean="0"/>
+              <a:rPr lang="ko-KR" altLang="en-US"/>
               <a:t>둘째 목차</a:t>
             </a:r>
-            <a:endParaRPr lang="ko-KR" altLang="en-US"/>
           </a:p>
           <a:p>
             <a:pPr lvl="0"/>
             <a:r>
-              <a:rPr lang="ko-KR" altLang="en-US" smtClean="0"/>
+              <a:rPr lang="ko-KR" altLang="en-US"/>
               <a:t>셋째 목차</a:t>
             </a:r>
-            <a:endParaRPr lang="ko-KR" altLang="en-US"/>
           </a:p>
           <a:p>
             <a:pPr lvl="0"/>
             <a:r>
-              <a:rPr lang="ko-KR" altLang="en-US" smtClean="0"/>
+              <a:rPr lang="ko-KR" altLang="en-US"/>
               <a:t>넷째 목차</a:t>
             </a:r>
-            <a:endParaRPr lang="ko-KR" altLang="en-US"/>
           </a:p>
           <a:p>
             <a:pPr lvl="0"/>
             <a:r>
-              <a:rPr lang="ko-KR" altLang="en-US" smtClean="0"/>
+              <a:rPr lang="ko-KR" altLang="en-US"/>
               <a:t>다섯째 목차</a:t>
             </a:r>
-            <a:endParaRPr lang="ko-KR" altLang="en-US"/>
           </a:p>
         </p:txBody>
       </p:sp>
@@ -1113,7 +1156,7 @@
             <a:fld id="{956FEC12-A4C9-4837-AF94-AD867782C04C}" type="datetime1">
               <a:rPr lang="ko-KR" altLang="en-US" smtClean="0"/>
               <a:pPr/>
-              <a:t>2009-12-07</a:t>
+              <a:t>2022-11-27</a:t>
             </a:fld>
             <a:endParaRPr lang="ko-KR" altLang="en-US"/>
           </a:p>
@@ -1171,7 +1214,7 @@
 </file>
 
 <file path=ppt/slideLayouts/slideLayout12.xml><?xml version="1.0" encoding="utf-8"?>
-<p:sldLayout xmlns:r="http://schemas.openxmlformats.org/officeDocument/2006/relationships" xmlns:c="http://schemas.openxmlformats.org/drawingml/2006/chart" xmlns:a="http://schemas.openxmlformats.org/drawingml/2006/main" xmlns:dgm="http://schemas.openxmlformats.org/drawingml/2006/diagram" xmlns:dsp="http://schemas.microsoft.com/office/drawing/2008/diagram" xmlns:p="http://schemas.openxmlformats.org/presentationml/2006/main" showMasterPhAnim="1" type="vertTitleAndTx" preserve="1">
+<p:sldLayout xmlns:a="http://schemas.openxmlformats.org/drawingml/2006/main" xmlns:r="http://schemas.openxmlformats.org/officeDocument/2006/relationships" xmlns:p="http://schemas.openxmlformats.org/presentationml/2006/main" type="vertTitleAndTx" preserve="1">
   <p:cSld name="세로 제목 및 본문">
     <p:spTree>
       <p:nvGrpSpPr>
@@ -1194,7 +1237,7 @@
             <a:spLocks noGrp="1"/>
           </p:cNvSpPr>
           <p:nvPr>
-            <p:ph type="title" orient="vert" idx="0"/>
+            <p:ph type="title" orient="vert"/>
           </p:nvPr>
         </p:nvSpPr>
         <p:spPr>
@@ -1208,10 +1251,9 @@
           <a:lstStyle/>
           <a:p>
             <a:r>
-              <a:rPr lang="ko-KR" altLang="en-US" smtClean="0"/>
+              <a:rPr lang="ko-KR" altLang="en-US"/>
               <a:t>마스터 제목 스타일 편집</a:t>
             </a:r>
-            <a:endParaRPr lang="ko-KR" altLang="en-US"/>
           </a:p>
         </p:txBody>
       </p:sp>
@@ -1237,38 +1279,37 @@
           <a:p>
             <a:pPr lvl="0"/>
             <a:r>
-              <a:rPr lang="ko-KR" altLang="en-US" smtClean="0"/>
+              <a:rPr lang="ko-KR" altLang="en-US"/>
               <a:t>마스터 텍스트 스타일을 편집합니다</a:t>
             </a:r>
           </a:p>
           <a:p>
             <a:pPr lvl="1"/>
             <a:r>
-              <a:rPr lang="ko-KR" altLang="en-US" smtClean="0"/>
+              <a:rPr lang="ko-KR" altLang="en-US"/>
               <a:t>둘째 수준</a:t>
             </a:r>
           </a:p>
           <a:p>
             <a:pPr lvl="2"/>
             <a:r>
-              <a:rPr lang="ko-KR" altLang="en-US" smtClean="0"/>
+              <a:rPr lang="ko-KR" altLang="en-US"/>
               <a:t>셋째 수준</a:t>
             </a:r>
           </a:p>
           <a:p>
             <a:pPr lvl="3"/>
             <a:r>
-              <a:rPr lang="ko-KR" altLang="en-US" smtClean="0"/>
+              <a:rPr lang="ko-KR" altLang="en-US"/>
               <a:t>넷째 수준</a:t>
             </a:r>
           </a:p>
           <a:p>
             <a:pPr lvl="4"/>
             <a:r>
-              <a:rPr lang="ko-KR" altLang="en-US" smtClean="0"/>
+              <a:rPr lang="ko-KR" altLang="en-US"/>
               <a:t>다섯째 수준</a:t>
             </a:r>
-            <a:endParaRPr lang="ko-KR" altLang="en-US"/>
           </a:p>
         </p:txBody>
       </p:sp>
@@ -1290,7 +1331,7 @@
             <a:fld id="{957F84A3-4F29-4053-ACFD-1BAF2D3F140C}" type="datetime1">
               <a:rPr lang="ko-KR" altLang="en-US" smtClean="0"/>
               <a:pPr/>
-              <a:t>2009-12-07</a:t>
+              <a:t>2022-11-27</a:t>
             </a:fld>
             <a:endParaRPr lang="ko-KR" altLang="en-US"/>
           </a:p>
@@ -1348,7 +1389,7 @@
 </file>
 
 <file path=ppt/slideLayouts/slideLayout2.xml><?xml version="1.0" encoding="utf-8"?>
-<p:sldLayout xmlns:r="http://schemas.openxmlformats.org/officeDocument/2006/relationships" xmlns:c="http://schemas.openxmlformats.org/drawingml/2006/chart" xmlns:a="http://schemas.openxmlformats.org/drawingml/2006/main" xmlns:dgm="http://schemas.openxmlformats.org/drawingml/2006/diagram" xmlns:dsp="http://schemas.microsoft.com/office/drawing/2008/diagram" xmlns:p="http://schemas.openxmlformats.org/presentationml/2006/main" showMasterPhAnim="1" type="obj" preserve="1">
+<p:sldLayout xmlns:a="http://schemas.openxmlformats.org/drawingml/2006/main" xmlns:r="http://schemas.openxmlformats.org/officeDocument/2006/relationships" xmlns:p="http://schemas.openxmlformats.org/presentationml/2006/main" type="obj" preserve="1">
   <p:cSld name="제목 및 내용">
     <p:spTree>
       <p:nvGrpSpPr>
@@ -1371,19 +1412,18 @@
             <a:spLocks noGrp="1"/>
           </p:cNvSpPr>
           <p:nvPr>
-            <p:ph type="title" idx="0"/>
-          </p:nvPr>
-        </p:nvSpPr>
-        <p:spPr/>
-        <p:txBody>
-          <a:bodyPr/>
-          <a:lstStyle/>
-          <a:p>
-            <a:r>
-              <a:rPr lang="ko-KR" altLang="en-US" smtClean="0"/>
+            <p:ph type="title"/>
+          </p:nvPr>
+        </p:nvSpPr>
+        <p:spPr/>
+        <p:txBody>
+          <a:bodyPr/>
+          <a:lstStyle/>
+          <a:p>
+            <a:r>
+              <a:rPr lang="ko-KR" altLang="en-US"/>
               <a:t>마스터 제목 스타일 편집</a:t>
             </a:r>
-            <a:endParaRPr lang="ko-KR" altLang="en-US"/>
           </a:p>
         </p:txBody>
       </p:sp>
@@ -1404,38 +1444,37 @@
           <a:p>
             <a:pPr lvl="0"/>
             <a:r>
-              <a:rPr lang="ko-KR" altLang="en-US" smtClean="0"/>
+              <a:rPr lang="ko-KR" altLang="en-US"/>
               <a:t>마스터 텍스트 스타일을 편집합니다</a:t>
             </a:r>
           </a:p>
           <a:p>
             <a:pPr lvl="1"/>
             <a:r>
-              <a:rPr lang="ko-KR" altLang="en-US" smtClean="0"/>
+              <a:rPr lang="ko-KR" altLang="en-US"/>
               <a:t>둘째 수준</a:t>
             </a:r>
           </a:p>
           <a:p>
             <a:pPr lvl="2"/>
             <a:r>
-              <a:rPr lang="ko-KR" altLang="en-US" smtClean="0"/>
+              <a:rPr lang="ko-KR" altLang="en-US"/>
               <a:t>셋째 수준</a:t>
             </a:r>
           </a:p>
           <a:p>
             <a:pPr lvl="3"/>
             <a:r>
-              <a:rPr lang="ko-KR" altLang="en-US" smtClean="0"/>
+              <a:rPr lang="ko-KR" altLang="en-US"/>
               <a:t>넷째 수준</a:t>
             </a:r>
           </a:p>
           <a:p>
             <a:pPr lvl="4"/>
             <a:r>
-              <a:rPr lang="ko-KR" altLang="en-US" smtClean="0"/>
+              <a:rPr lang="ko-KR" altLang="en-US"/>
               <a:t>다섯째 수준</a:t>
             </a:r>
-            <a:endParaRPr lang="ko-KR" altLang="en-US"/>
           </a:p>
         </p:txBody>
       </p:sp>
@@ -1457,7 +1496,7 @@
             <a:fld id="{4953836A-82A3-4C8B-9D31-CD724F3673ED}" type="datetime1">
               <a:rPr lang="ko-KR" altLang="en-US" smtClean="0"/>
               <a:pPr/>
-              <a:t>2009-12-07</a:t>
+              <a:t>2022-11-27</a:t>
             </a:fld>
             <a:endParaRPr lang="ko-KR" altLang="en-US"/>
           </a:p>
@@ -1515,7 +1554,7 @@
 </file>
 
 <file path=ppt/slideLayouts/slideLayout3.xml><?xml version="1.0" encoding="utf-8"?>
-<p:sldLayout xmlns:r="http://schemas.openxmlformats.org/officeDocument/2006/relationships" xmlns:c="http://schemas.openxmlformats.org/drawingml/2006/chart" xmlns:a="http://schemas.openxmlformats.org/drawingml/2006/main" xmlns:dgm="http://schemas.openxmlformats.org/drawingml/2006/diagram" xmlns:dsp="http://schemas.microsoft.com/office/drawing/2008/diagram" xmlns:p="http://schemas.openxmlformats.org/presentationml/2006/main" showMasterPhAnim="1" type="blank" preserve="1">
+<p:sldLayout xmlns:a="http://schemas.openxmlformats.org/drawingml/2006/main" xmlns:r="http://schemas.openxmlformats.org/officeDocument/2006/relationships" xmlns:p="http://schemas.openxmlformats.org/presentationml/2006/main" type="blank" preserve="1">
   <p:cSld name="빈 화면">
     <p:spTree>
       <p:nvGrpSpPr>
@@ -1549,7 +1588,7 @@
             <a:fld id="{AD2EBAF6-36D0-4DD8-B695-D4C1B37E35D6}" type="datetime1">
               <a:rPr lang="ko-KR" altLang="en-US" smtClean="0"/>
               <a:pPr/>
-              <a:t>2009-12-07</a:t>
+              <a:t>2022-11-27</a:t>
             </a:fld>
             <a:endParaRPr lang="ko-KR" altLang="en-US"/>
           </a:p>
@@ -1607,7 +1646,7 @@
 </file>
 
 <file path=ppt/slideLayouts/slideLayout4.xml><?xml version="1.0" encoding="utf-8"?>
-<p:sldLayout xmlns:r="http://schemas.openxmlformats.org/officeDocument/2006/relationships" xmlns:c="http://schemas.openxmlformats.org/drawingml/2006/chart" xmlns:a="http://schemas.openxmlformats.org/drawingml/2006/main" xmlns:dgm="http://schemas.openxmlformats.org/drawingml/2006/diagram" xmlns:dsp="http://schemas.microsoft.com/office/drawing/2008/diagram" xmlns:p="http://schemas.openxmlformats.org/presentationml/2006/main" showMasterPhAnim="1" type="secHead" preserve="1">
+<p:sldLayout xmlns:a="http://schemas.openxmlformats.org/drawingml/2006/main" xmlns:r="http://schemas.openxmlformats.org/officeDocument/2006/relationships" xmlns:p="http://schemas.openxmlformats.org/presentationml/2006/main" type="secHead" preserve="1">
   <p:cSld name="구역 머리글">
     <p:spTree>
       <p:nvGrpSpPr>
@@ -1630,7 +1669,7 @@
             <a:spLocks noGrp="1"/>
           </p:cNvSpPr>
           <p:nvPr>
-            <p:ph type="title" idx="0"/>
+            <p:ph type="title"/>
           </p:nvPr>
         </p:nvSpPr>
         <p:spPr>
@@ -1648,10 +1687,9 @@
           </a:lstStyle>
           <a:p>
             <a:r>
-              <a:rPr lang="ko-KR" altLang="en-US" smtClean="0"/>
+              <a:rPr lang="ko-KR" altLang="en-US"/>
               <a:t>마스터 제목 스타일 편집</a:t>
             </a:r>
-            <a:endParaRPr lang="ko-KR" altLang="en-US"/>
           </a:p>
         </p:txBody>
       </p:sp>
@@ -1768,7 +1806,7 @@
           <a:p>
             <a:pPr lvl="0"/>
             <a:r>
-              <a:rPr lang="ko-KR" altLang="en-US" smtClean="0"/>
+              <a:rPr lang="ko-KR" altLang="en-US"/>
               <a:t>마스터 텍스트 스타일을 편집합니다</a:t>
             </a:r>
           </a:p>
@@ -1792,7 +1830,7 @@
             <a:fld id="{60728D28-603B-4EFC-80F8-17E5E9107035}" type="datetime1">
               <a:rPr lang="ko-KR" altLang="en-US" smtClean="0"/>
               <a:pPr/>
-              <a:t>2009-12-07</a:t>
+              <a:t>2022-11-27</a:t>
             </a:fld>
             <a:endParaRPr lang="ko-KR" altLang="en-US"/>
           </a:p>
@@ -1850,7 +1888,7 @@
 </file>
 
 <file path=ppt/slideLayouts/slideLayout5.xml><?xml version="1.0" encoding="utf-8"?>
-<p:sldLayout xmlns:r="http://schemas.openxmlformats.org/officeDocument/2006/relationships" xmlns:c="http://schemas.openxmlformats.org/drawingml/2006/chart" xmlns:a="http://schemas.openxmlformats.org/drawingml/2006/main" xmlns:dgm="http://schemas.openxmlformats.org/drawingml/2006/diagram" xmlns:dsp="http://schemas.microsoft.com/office/drawing/2008/diagram" xmlns:p="http://schemas.openxmlformats.org/presentationml/2006/main" showMasterPhAnim="1" type="twoObj" preserve="1">
+<p:sldLayout xmlns:a="http://schemas.openxmlformats.org/drawingml/2006/main" xmlns:r="http://schemas.openxmlformats.org/officeDocument/2006/relationships" xmlns:p="http://schemas.openxmlformats.org/presentationml/2006/main" type="twoObj" preserve="1">
   <p:cSld name="내용 2개">
     <p:spTree>
       <p:nvGrpSpPr>
@@ -1873,19 +1911,18 @@
             <a:spLocks noGrp="1"/>
           </p:cNvSpPr>
           <p:nvPr>
-            <p:ph type="title" idx="0"/>
-          </p:nvPr>
-        </p:nvSpPr>
-        <p:spPr/>
-        <p:txBody>
-          <a:bodyPr/>
-          <a:lstStyle/>
-          <a:p>
-            <a:r>
-              <a:rPr lang="ko-KR" altLang="en-US" smtClean="0"/>
+            <p:ph type="title"/>
+          </p:nvPr>
+        </p:nvSpPr>
+        <p:spPr/>
+        <p:txBody>
+          <a:bodyPr/>
+          <a:lstStyle/>
+          <a:p>
+            <a:r>
+              <a:rPr lang="ko-KR" altLang="en-US"/>
               <a:t>마스터 제목 스타일 편집</a:t>
             </a:r>
-            <a:endParaRPr lang="ko-KR" altLang="en-US"/>
           </a:p>
         </p:txBody>
       </p:sp>
@@ -1939,38 +1976,37 @@
           <a:p>
             <a:pPr lvl="0"/>
             <a:r>
-              <a:rPr lang="ko-KR" altLang="en-US" smtClean="0"/>
+              <a:rPr lang="ko-KR" altLang="en-US"/>
               <a:t>마스터 텍스트 스타일을 편집합니다</a:t>
             </a:r>
           </a:p>
           <a:p>
             <a:pPr lvl="1"/>
             <a:r>
-              <a:rPr lang="ko-KR" altLang="en-US" smtClean="0"/>
+              <a:rPr lang="ko-KR" altLang="en-US"/>
               <a:t>둘째 수준</a:t>
             </a:r>
           </a:p>
           <a:p>
             <a:pPr lvl="2"/>
             <a:r>
-              <a:rPr lang="ko-KR" altLang="en-US" smtClean="0"/>
+              <a:rPr lang="ko-KR" altLang="en-US"/>
               <a:t>셋째 수준</a:t>
             </a:r>
           </a:p>
           <a:p>
             <a:pPr lvl="3"/>
             <a:r>
-              <a:rPr lang="ko-KR" altLang="en-US" smtClean="0"/>
+              <a:rPr lang="ko-KR" altLang="en-US"/>
               <a:t>넷째 수준</a:t>
             </a:r>
           </a:p>
           <a:p>
             <a:pPr lvl="4"/>
             <a:r>
-              <a:rPr lang="ko-KR" altLang="en-US" smtClean="0"/>
+              <a:rPr lang="ko-KR" altLang="en-US"/>
               <a:t>다섯째 수준</a:t>
             </a:r>
-            <a:endParaRPr lang="ko-KR" altLang="en-US"/>
           </a:p>
         </p:txBody>
       </p:sp>
@@ -2024,38 +2060,37 @@
           <a:p>
             <a:pPr lvl="0"/>
             <a:r>
-              <a:rPr lang="ko-KR" altLang="en-US" smtClean="0"/>
+              <a:rPr lang="ko-KR" altLang="en-US"/>
               <a:t>마스터 텍스트 스타일을 편집합니다</a:t>
             </a:r>
           </a:p>
           <a:p>
             <a:pPr lvl="1"/>
             <a:r>
-              <a:rPr lang="ko-KR" altLang="en-US" smtClean="0"/>
+              <a:rPr lang="ko-KR" altLang="en-US"/>
               <a:t>둘째 수준</a:t>
             </a:r>
           </a:p>
           <a:p>
             <a:pPr lvl="2"/>
             <a:r>
-              <a:rPr lang="ko-KR" altLang="en-US" smtClean="0"/>
+              <a:rPr lang="ko-KR" altLang="en-US"/>
               <a:t>셋째 수준</a:t>
             </a:r>
           </a:p>
           <a:p>
             <a:pPr lvl="3"/>
             <a:r>
-              <a:rPr lang="ko-KR" altLang="en-US" smtClean="0"/>
+              <a:rPr lang="ko-KR" altLang="en-US"/>
               <a:t>넷째 수준</a:t>
             </a:r>
           </a:p>
           <a:p>
             <a:pPr lvl="4"/>
             <a:r>
-              <a:rPr lang="ko-KR" altLang="en-US" smtClean="0"/>
+              <a:rPr lang="ko-KR" altLang="en-US"/>
               <a:t>다섯째 수준</a:t>
             </a:r>
-            <a:endParaRPr lang="ko-KR" altLang="en-US"/>
           </a:p>
         </p:txBody>
       </p:sp>
@@ -2077,7 +2112,7 @@
             <a:fld id="{A27A1F4E-0809-4239-8034-C38E431DAF92}" type="datetime1">
               <a:rPr lang="ko-KR" altLang="en-US" smtClean="0"/>
               <a:pPr/>
-              <a:t>2009-12-07</a:t>
+              <a:t>2022-11-27</a:t>
             </a:fld>
             <a:endParaRPr lang="ko-KR" altLang="en-US"/>
           </a:p>
@@ -2135,7 +2170,7 @@
 </file>
 
 <file path=ppt/slideLayouts/slideLayout6.xml><?xml version="1.0" encoding="utf-8"?>
-<p:sldLayout xmlns:r="http://schemas.openxmlformats.org/officeDocument/2006/relationships" xmlns:c="http://schemas.openxmlformats.org/drawingml/2006/chart" xmlns:a="http://schemas.openxmlformats.org/drawingml/2006/main" xmlns:dgm="http://schemas.openxmlformats.org/drawingml/2006/diagram" xmlns:dsp="http://schemas.microsoft.com/office/drawing/2008/diagram" xmlns:p="http://schemas.openxmlformats.org/presentationml/2006/main" showMasterPhAnim="1" type="titleOnly" preserve="1">
+<p:sldLayout xmlns:a="http://schemas.openxmlformats.org/drawingml/2006/main" xmlns:r="http://schemas.openxmlformats.org/officeDocument/2006/relationships" xmlns:p="http://schemas.openxmlformats.org/presentationml/2006/main" type="titleOnly" preserve="1">
   <p:cSld name="제목만">
     <p:spTree>
       <p:nvGrpSpPr>
@@ -2158,19 +2193,18 @@
             <a:spLocks noGrp="1"/>
           </p:cNvSpPr>
           <p:nvPr>
-            <p:ph type="title" idx="0"/>
-          </p:nvPr>
-        </p:nvSpPr>
-        <p:spPr/>
-        <p:txBody>
-          <a:bodyPr/>
-          <a:lstStyle/>
-          <a:p>
-            <a:r>
-              <a:rPr lang="ko-KR" altLang="en-US" smtClean="0"/>
+            <p:ph type="title"/>
+          </p:nvPr>
+        </p:nvSpPr>
+        <p:spPr/>
+        <p:txBody>
+          <a:bodyPr/>
+          <a:lstStyle/>
+          <a:p>
+            <a:r>
+              <a:rPr lang="ko-KR" altLang="en-US"/>
               <a:t>마스터 제목 스타일 편집</a:t>
             </a:r>
-            <a:endParaRPr lang="ko-KR" altLang="en-US"/>
           </a:p>
         </p:txBody>
       </p:sp>
@@ -2192,7 +2226,7 @@
             <a:fld id="{5E0DA496-7307-4E8B-88DE-CB97B48BAB6F}" type="datetime1">
               <a:rPr lang="ko-KR" altLang="en-US" smtClean="0"/>
               <a:pPr/>
-              <a:t>2009-12-07</a:t>
+              <a:t>2022-11-27</a:t>
             </a:fld>
             <a:endParaRPr lang="ko-KR" altLang="en-US"/>
           </a:p>
@@ -2250,7 +2284,7 @@
 </file>
 
 <file path=ppt/slideLayouts/slideLayout7.xml><?xml version="1.0" encoding="utf-8"?>
-<p:sldLayout xmlns:r="http://schemas.openxmlformats.org/officeDocument/2006/relationships" xmlns:c="http://schemas.openxmlformats.org/drawingml/2006/chart" xmlns:a="http://schemas.openxmlformats.org/drawingml/2006/main" xmlns:dgm="http://schemas.openxmlformats.org/drawingml/2006/diagram" xmlns:dsp="http://schemas.microsoft.com/office/drawing/2008/diagram" xmlns:p="http://schemas.openxmlformats.org/presentationml/2006/main" showMasterPhAnim="1" type="tbl" preserve="1">
+<p:sldLayout xmlns:a="http://schemas.openxmlformats.org/drawingml/2006/main" xmlns:r="http://schemas.openxmlformats.org/officeDocument/2006/relationships" xmlns:p="http://schemas.openxmlformats.org/presentationml/2006/main" type="tbl" preserve="1">
   <p:cSld name="표">
     <p:spTree>
       <p:nvGrpSpPr>
@@ -2273,19 +2307,18 @@
             <a:spLocks noGrp="1"/>
           </p:cNvSpPr>
           <p:nvPr>
-            <p:ph type="title" idx="0"/>
-          </p:nvPr>
-        </p:nvSpPr>
-        <p:spPr/>
-        <p:txBody>
-          <a:bodyPr/>
-          <a:lstStyle/>
-          <a:p>
-            <a:r>
-              <a:rPr lang="ko-KR" altLang="en-US" smtClean="0"/>
+            <p:ph type="title"/>
+          </p:nvPr>
+        </p:nvSpPr>
+        <p:spPr/>
+        <p:txBody>
+          <a:bodyPr/>
+          <a:lstStyle/>
+          <a:p>
+            <a:r>
+              <a:rPr lang="ko-KR" altLang="en-US"/>
               <a:t>마스터 제목 스타일 편집</a:t>
             </a:r>
-            <a:endParaRPr lang="ko-KR" altLang="en-US"/>
           </a:p>
         </p:txBody>
       </p:sp>
@@ -2316,10 +2349,9 @@
           </a:lstStyle>
           <a:p>
             <a:r>
-              <a:rPr lang="ko-KR" altLang="en-US" smtClean="0"/>
+              <a:rPr lang="ko-KR" altLang="en-US"/>
               <a:t>표를 추가하려면 아이콘을 클릭하십시오</a:t>
             </a:r>
-            <a:endParaRPr lang="ko-KR" altLang="en-US"/>
           </a:p>
         </p:txBody>
       </p:sp>
@@ -2341,7 +2373,7 @@
             <a:fld id="{58721E90-850C-410B-8B89-8394F580CFDA}" type="datetime1">
               <a:rPr lang="ko-KR" altLang="en-US" smtClean="0"/>
               <a:pPr/>
-              <a:t>2009-12-07</a:t>
+              <a:t>2022-11-27</a:t>
             </a:fld>
             <a:endParaRPr lang="ko-KR" altLang="en-US"/>
           </a:p>
@@ -2399,7 +2431,7 @@
 </file>
 
 <file path=ppt/slideLayouts/slideLayout8.xml><?xml version="1.0" encoding="utf-8"?>
-<p:sldLayout xmlns:r="http://schemas.openxmlformats.org/officeDocument/2006/relationships" xmlns:c="http://schemas.openxmlformats.org/drawingml/2006/chart" xmlns:a="http://schemas.openxmlformats.org/drawingml/2006/main" xmlns:dgm="http://schemas.openxmlformats.org/drawingml/2006/diagram" xmlns:dsp="http://schemas.microsoft.com/office/drawing/2008/diagram" xmlns:p="http://schemas.openxmlformats.org/presentationml/2006/main" showMasterPhAnim="1" type="fourObj" preserve="1">
+<p:sldLayout xmlns:a="http://schemas.openxmlformats.org/drawingml/2006/main" xmlns:r="http://schemas.openxmlformats.org/officeDocument/2006/relationships" xmlns:p="http://schemas.openxmlformats.org/presentationml/2006/main" type="fourObj" preserve="1">
   <p:cSld name="내용 4개">
     <p:spTree>
       <p:nvGrpSpPr>
@@ -2422,19 +2454,18 @@
             <a:spLocks noGrp="1"/>
           </p:cNvSpPr>
           <p:nvPr>
-            <p:ph type="title" idx="0"/>
-          </p:nvPr>
-        </p:nvSpPr>
-        <p:spPr/>
-        <p:txBody>
-          <a:bodyPr/>
-          <a:lstStyle/>
-          <a:p>
-            <a:r>
-              <a:rPr lang="ko-KR" altLang="en-US" smtClean="0"/>
+            <p:ph type="title"/>
+          </p:nvPr>
+        </p:nvSpPr>
+        <p:spPr/>
+        <p:txBody>
+          <a:bodyPr/>
+          <a:lstStyle/>
+          <a:p>
+            <a:r>
+              <a:rPr lang="ko-KR" altLang="en-US"/>
               <a:t>마스터 제목 스타일 편집</a:t>
             </a:r>
-            <a:endParaRPr lang="ko-KR" altLang="en-US"/>
           </a:p>
         </p:txBody>
       </p:sp>
@@ -2488,38 +2519,37 @@
           <a:p>
             <a:pPr lvl="0"/>
             <a:r>
-              <a:rPr lang="ko-KR" altLang="en-US" smtClean="0"/>
+              <a:rPr lang="ko-KR" altLang="en-US"/>
               <a:t>마스터 텍스트 스타일을 편집합니다</a:t>
             </a:r>
           </a:p>
           <a:p>
             <a:pPr lvl="1"/>
             <a:r>
-              <a:rPr lang="ko-KR" altLang="en-US" smtClean="0"/>
+              <a:rPr lang="ko-KR" altLang="en-US"/>
               <a:t>둘째 수준</a:t>
             </a:r>
           </a:p>
           <a:p>
             <a:pPr lvl="2"/>
             <a:r>
-              <a:rPr lang="ko-KR" altLang="en-US" smtClean="0"/>
+              <a:rPr lang="ko-KR" altLang="en-US"/>
               <a:t>셋째 수준</a:t>
             </a:r>
           </a:p>
           <a:p>
             <a:pPr lvl="3"/>
             <a:r>
-              <a:rPr lang="ko-KR" altLang="en-US" smtClean="0"/>
+              <a:rPr lang="ko-KR" altLang="en-US"/>
               <a:t>넷째 수준</a:t>
             </a:r>
           </a:p>
           <a:p>
             <a:pPr lvl="4"/>
             <a:r>
-              <a:rPr lang="ko-KR" altLang="en-US" smtClean="0"/>
+              <a:rPr lang="ko-KR" altLang="en-US"/>
               <a:t>다섯째 수준</a:t>
             </a:r>
-            <a:endParaRPr lang="ko-KR" altLang="en-US"/>
           </a:p>
         </p:txBody>
       </p:sp>
@@ -2573,38 +2603,37 @@
           <a:p>
             <a:pPr lvl="0"/>
             <a:r>
-              <a:rPr lang="ko-KR" altLang="en-US" smtClean="0"/>
+              <a:rPr lang="ko-KR" altLang="en-US"/>
               <a:t>마스터 텍스트 스타일을 편집합니다</a:t>
             </a:r>
           </a:p>
           <a:p>
             <a:pPr lvl="1"/>
             <a:r>
-              <a:rPr lang="ko-KR" altLang="en-US" smtClean="0"/>
+              <a:rPr lang="ko-KR" altLang="en-US"/>
               <a:t>둘째 수준</a:t>
             </a:r>
           </a:p>
           <a:p>
             <a:pPr lvl="2"/>
             <a:r>
-              <a:rPr lang="ko-KR" altLang="en-US" smtClean="0"/>
+              <a:rPr lang="ko-KR" altLang="en-US"/>
               <a:t>셋째 수준</a:t>
             </a:r>
           </a:p>
           <a:p>
             <a:pPr lvl="3"/>
             <a:r>
-              <a:rPr lang="ko-KR" altLang="en-US" smtClean="0"/>
+              <a:rPr lang="ko-KR" altLang="en-US"/>
               <a:t>넷째 수준</a:t>
             </a:r>
           </a:p>
           <a:p>
             <a:pPr lvl="4"/>
             <a:r>
-              <a:rPr lang="ko-KR" altLang="en-US" smtClean="0"/>
+              <a:rPr lang="ko-KR" altLang="en-US"/>
               <a:t>다섯째 수준</a:t>
             </a:r>
-            <a:endParaRPr lang="ko-KR" altLang="en-US"/>
           </a:p>
         </p:txBody>
       </p:sp>
@@ -2658,38 +2687,37 @@
           <a:p>
             <a:pPr lvl="0"/>
             <a:r>
-              <a:rPr lang="ko-KR" altLang="en-US" smtClean="0"/>
+              <a:rPr lang="ko-KR" altLang="en-US"/>
               <a:t>마스터 텍스트 스타일을 편집합니다</a:t>
             </a:r>
           </a:p>
           <a:p>
             <a:pPr lvl="1"/>
             <a:r>
-              <a:rPr lang="ko-KR" altLang="en-US" smtClean="0"/>
+              <a:rPr lang="ko-KR" altLang="en-US"/>
               <a:t>둘째 수준</a:t>
             </a:r>
           </a:p>
           <a:p>
             <a:pPr lvl="2"/>
             <a:r>
-              <a:rPr lang="ko-KR" altLang="en-US" smtClean="0"/>
+              <a:rPr lang="ko-KR" altLang="en-US"/>
               <a:t>셋째 수준</a:t>
             </a:r>
           </a:p>
           <a:p>
             <a:pPr lvl="3"/>
             <a:r>
-              <a:rPr lang="ko-KR" altLang="en-US" smtClean="0"/>
+              <a:rPr lang="ko-KR" altLang="en-US"/>
               <a:t>넷째 수준</a:t>
             </a:r>
           </a:p>
           <a:p>
             <a:pPr lvl="4"/>
             <a:r>
-              <a:rPr lang="ko-KR" altLang="en-US" smtClean="0"/>
+              <a:rPr lang="ko-KR" altLang="en-US"/>
               <a:t>다섯째 수준</a:t>
             </a:r>
-            <a:endParaRPr lang="ko-KR" altLang="en-US"/>
           </a:p>
         </p:txBody>
       </p:sp>
@@ -2743,38 +2771,37 @@
           <a:p>
             <a:pPr lvl="0"/>
             <a:r>
-              <a:rPr lang="ko-KR" altLang="en-US" smtClean="0"/>
+              <a:rPr lang="ko-KR" altLang="en-US"/>
               <a:t>마스터 텍스트 스타일을 편집합니다</a:t>
             </a:r>
           </a:p>
           <a:p>
             <a:pPr lvl="1"/>
             <a:r>
-              <a:rPr lang="ko-KR" altLang="en-US" smtClean="0"/>
+              <a:rPr lang="ko-KR" altLang="en-US"/>
               <a:t>둘째 수준</a:t>
             </a:r>
           </a:p>
           <a:p>
             <a:pPr lvl="2"/>
             <a:r>
-              <a:rPr lang="ko-KR" altLang="en-US" smtClean="0"/>
+              <a:rPr lang="ko-KR" altLang="en-US"/>
               <a:t>셋째 수준</a:t>
             </a:r>
           </a:p>
           <a:p>
             <a:pPr lvl="3"/>
             <a:r>
-              <a:rPr lang="ko-KR" altLang="en-US" smtClean="0"/>
+              <a:rPr lang="ko-KR" altLang="en-US"/>
               <a:t>넷째 수준</a:t>
             </a:r>
           </a:p>
           <a:p>
             <a:pPr lvl="4"/>
             <a:r>
-              <a:rPr lang="ko-KR" altLang="en-US" smtClean="0"/>
+              <a:rPr lang="ko-KR" altLang="en-US"/>
               <a:t>다섯째 수준</a:t>
             </a:r>
-            <a:endParaRPr lang="ko-KR" altLang="en-US"/>
           </a:p>
         </p:txBody>
       </p:sp>
@@ -2796,7 +2823,7 @@
             <a:fld id="{5ACE7E28-9336-4363-8674-B91477D8F243}" type="datetime1">
               <a:rPr lang="ko-KR" altLang="en-US" smtClean="0"/>
               <a:pPr/>
-              <a:t>2009-12-07</a:t>
+              <a:t>2022-11-27</a:t>
             </a:fld>
             <a:endParaRPr lang="ko-KR" altLang="en-US"/>
           </a:p>
@@ -2854,7 +2881,7 @@
 </file>
 
 <file path=ppt/slideLayouts/slideLayout9.xml><?xml version="1.0" encoding="utf-8"?>
-<p:sldLayout xmlns:r="http://schemas.openxmlformats.org/officeDocument/2006/relationships" xmlns:c="http://schemas.openxmlformats.org/drawingml/2006/chart" xmlns:a="http://schemas.openxmlformats.org/drawingml/2006/main" xmlns:dgm="http://schemas.openxmlformats.org/drawingml/2006/diagram" xmlns:dsp="http://schemas.microsoft.com/office/drawing/2008/diagram" xmlns:p="http://schemas.openxmlformats.org/presentationml/2006/main" showMasterPhAnim="1" type="picTx" preserve="1">
+<p:sldLayout xmlns:a="http://schemas.openxmlformats.org/drawingml/2006/main" xmlns:r="http://schemas.openxmlformats.org/officeDocument/2006/relationships" xmlns:p="http://schemas.openxmlformats.org/presentationml/2006/main" type="picTx" preserve="1">
   <p:cSld name="그림 및 설명">
     <p:spTree>
       <p:nvGrpSpPr>
@@ -2877,7 +2904,7 @@
             <a:spLocks noGrp="1"/>
           </p:cNvSpPr>
           <p:nvPr>
-            <p:ph type="title" idx="0"/>
+            <p:ph type="title"/>
           </p:nvPr>
         </p:nvSpPr>
         <p:spPr>
@@ -2895,10 +2922,9 @@
           </a:lstStyle>
           <a:p>
             <a:r>
-              <a:rPr lang="ko-KR" altLang="en-US" smtClean="0"/>
+              <a:rPr lang="ko-KR" altLang="en-US"/>
               <a:t>마스터 제목 스타일 편집</a:t>
             </a:r>
-            <a:endParaRPr lang="ko-KR" altLang="en-US"/>
           </a:p>
         </p:txBody>
       </p:sp>
@@ -2960,10 +2986,9 @@
           </a:lstStyle>
           <a:p>
             <a:r>
-              <a:rPr lang="ko-KR" altLang="en-US" smtClean="0"/>
+              <a:rPr lang="ko-KR" altLang="en-US"/>
               <a:t>그림을 추가하려면 아이콘을 클릭하십시오</a:t>
             </a:r>
-            <a:endParaRPr lang="ko-KR" altLang="en-US"/>
           </a:p>
         </p:txBody>
       </p:sp>
@@ -3025,10 +3050,9 @@
           </a:lstStyle>
           <a:p>
             <a:r>
-              <a:rPr lang="ko-KR" altLang="en-US" smtClean="0"/>
+              <a:rPr lang="ko-KR" altLang="en-US"/>
               <a:t>마스터 텍스트 스타일을 편집합니다</a:t>
             </a:r>
-            <a:endParaRPr lang="ko-KR" altLang="en-US"/>
           </a:p>
         </p:txBody>
       </p:sp>
@@ -3050,7 +3074,7 @@
             <a:fld id="{5ACE7E28-9336-4363-8674-B91477D8F243}" type="datetime1">
               <a:rPr lang="ko-KR" altLang="en-US" smtClean="0"/>
               <a:pPr/>
-              <a:t>2009-12-07</a:t>
+              <a:t>2022-11-27</a:t>
             </a:fld>
             <a:endParaRPr lang="ko-KR" altLang="en-US"/>
           </a:p>
@@ -3108,7 +3132,7 @@
 </file>
 
 <file path=ppt/slideMasters/slideMaster1.xml><?xml version="1.0" encoding="utf-8"?>
-<p:sldMaster xmlns:r="http://schemas.openxmlformats.org/officeDocument/2006/relationships" xmlns:c="http://schemas.openxmlformats.org/drawingml/2006/chart" xmlns:a="http://schemas.openxmlformats.org/drawingml/2006/main" xmlns:dgm="http://schemas.openxmlformats.org/drawingml/2006/diagram" xmlns:dsp="http://schemas.microsoft.com/office/drawing/2008/diagram" xmlns:p="http://schemas.openxmlformats.org/presentationml/2006/main">
+<p:sldMaster xmlns:a="http://schemas.openxmlformats.org/drawingml/2006/main" xmlns:r="http://schemas.openxmlformats.org/officeDocument/2006/relationships" xmlns:p="http://schemas.openxmlformats.org/presentationml/2006/main">
   <p:cSld>
     <p:bg>
       <p:bgRef idx="1001">
@@ -3136,7 +3160,7 @@
             <a:spLocks noGrp="1"/>
           </p:cNvSpPr>
           <p:nvPr>
-            <p:ph type="title" idx="0"/>
+            <p:ph type="title"/>
           </p:nvPr>
         </p:nvSpPr>
         <p:spPr>
@@ -3155,10 +3179,9 @@
           <a:lstStyle/>
           <a:p>
             <a:r>
-              <a:rPr lang="ko-KR" altLang="en-US" smtClean="0"/>
+              <a:rPr lang="ko-KR" altLang="en-US"/>
               <a:t>마스터 제목 스타일 편집</a:t>
             </a:r>
-            <a:endParaRPr lang="ko-KR" altLang="en-US"/>
           </a:p>
         </p:txBody>
       </p:sp>
@@ -3189,35 +3212,35 @@
           <a:p>
             <a:pPr lvl="0"/>
             <a:r>
-              <a:rPr lang="ko-KR" altLang="en-US" dirty="0" smtClean="0"/>
+              <a:rPr lang="ko-KR" altLang="en-US" dirty="0"/>
               <a:t>마스터 텍스트 스타일을 편집합니다</a:t>
             </a:r>
           </a:p>
           <a:p>
             <a:pPr lvl="1"/>
             <a:r>
-              <a:rPr lang="ko-KR" altLang="en-US" dirty="0" smtClean="0"/>
+              <a:rPr lang="ko-KR" altLang="en-US" dirty="0"/>
               <a:t>둘째 수준</a:t>
             </a:r>
           </a:p>
           <a:p>
             <a:pPr lvl="2"/>
             <a:r>
-              <a:rPr lang="ko-KR" altLang="en-US" dirty="0" smtClean="0"/>
+              <a:rPr lang="ko-KR" altLang="en-US" dirty="0"/>
               <a:t>셋째 수준</a:t>
             </a:r>
           </a:p>
           <a:p>
             <a:pPr lvl="3"/>
             <a:r>
-              <a:rPr lang="ko-KR" altLang="en-US" dirty="0" smtClean="0"/>
+              <a:rPr lang="ko-KR" altLang="en-US" dirty="0"/>
               <a:t>넷째 수준</a:t>
             </a:r>
           </a:p>
           <a:p>
             <a:pPr lvl="4"/>
             <a:r>
-              <a:rPr lang="ko-KR" altLang="en-US" dirty="0" smtClean="0"/>
+              <a:rPr lang="ko-KR" altLang="en-US" dirty="0"/>
               <a:t>다섯째 수준</a:t>
             </a:r>
             <a:endParaRPr lang="ko-KR" altLang="en-US"/>
@@ -3260,7 +3283,7 @@
             <a:fld id="{D422D86A-5F52-4165-8473-F1B836277586}" type="datetime1">
               <a:rPr lang="ko-KR" altLang="en-US" smtClean="0"/>
               <a:pPr/>
-              <a:t>2009-12-07</a:t>
+              <a:t>2022-11-27</a:t>
             </a:fld>
             <a:endParaRPr lang="ko-KR" altLang="en-US"/>
           </a:p>
@@ -3673,7 +3696,7 @@
 </file>
 
 <file path=ppt/slides/slide1.xml><?xml version="1.0" encoding="utf-8"?>
-<p:sld xmlns:r="http://schemas.openxmlformats.org/officeDocument/2006/relationships" xmlns:c="http://schemas.openxmlformats.org/drawingml/2006/chart" xmlns:a="http://schemas.openxmlformats.org/drawingml/2006/main" xmlns:dgm="http://schemas.openxmlformats.org/drawingml/2006/diagram" xmlns:dsp="http://schemas.microsoft.com/office/drawing/2008/diagram" xmlns:p="http://schemas.openxmlformats.org/presentationml/2006/main">
+<p:sld xmlns:a="http://schemas.openxmlformats.org/drawingml/2006/main" xmlns:r="http://schemas.openxmlformats.org/officeDocument/2006/relationships" xmlns:p="http://schemas.openxmlformats.org/presentationml/2006/main">
   <p:cSld>
     <p:spTree>
       <p:nvGrpSpPr>
@@ -3696,7 +3719,7 @@
             <a:spLocks noGrp="1"/>
           </p:cNvSpPr>
           <p:nvPr>
-            <p:ph type="ctrTitle" idx="0"/>
+            <p:ph type="ctrTitle"/>
           </p:nvPr>
         </p:nvSpPr>
         <p:spPr/>
@@ -3711,7 +3734,6 @@
               <a:rPr lang="en-US" altLang="ko-KR"/>
               <a:t>Autobahn</a:t>
             </a:r>
-            <a:endParaRPr lang="en-US" altLang="ko-KR"/>
           </a:p>
         </p:txBody>
       </p:sp>
@@ -3737,7 +3759,6 @@
               <a:rPr lang="en-US" altLang="ko-KR"/>
               <a:t>Traffic sign classification</a:t>
             </a:r>
-            <a:endParaRPr lang="en-US" altLang="ko-KR"/>
           </a:p>
           <a:p>
             <a:pPr>
@@ -3773,7 +3794,6 @@
               <a:rPr lang="ko-KR" altLang="en-US"/>
               <a:t> 이지은</a:t>
             </a:r>
-            <a:endParaRPr lang="ko-KR" altLang="en-US"/>
           </a:p>
         </p:txBody>
       </p:sp>
@@ -3782,19 +3802,19 @@
   <p:clrMapOvr>
     <a:masterClrMapping/>
   </p:clrMapOvr>
-  <mc:AlternateContent xmlns:mc="http://schemas.openxmlformats.org/markup-compatibility/2006">
-    <mc:Choice xmlns:p14="http://schemas.microsoft.com/office/powerpoint/2010/main" Requires="p14">
-      <p:transition xmlns:mc="http://schemas.openxmlformats.org/markup-compatibility/2006" xmlns:p14="http://schemas.microsoft.com/office/powerpoint/2010/main" mc:Ignorable="p14" p14:dur="500"/>
+  <mc:AlternateContent xmlns:mc="http://schemas.openxmlformats.org/markup-compatibility/2006" xmlns:p14="http://schemas.microsoft.com/office/powerpoint/2010/main">
+    <mc:Choice Requires="p14">
+      <p:transition/>
     </mc:Choice>
-    <mc:Fallback>
+    <mc:Fallback xmlns:dsp="http://schemas.microsoft.com/office/drawing/2008/diagram" xmlns:dgm="http://schemas.openxmlformats.org/drawingml/2006/diagram" xmlns:c="http://schemas.openxmlformats.org/drawingml/2006/chart" xmlns="">
       <p:transition/>
     </mc:Fallback>
   </mc:AlternateContent>
 </p:sld>
 </file>
 
-<file path=ppt/slides/slide2.xml><?xml version="1.0" encoding="utf-8"?>
-<p:sld xmlns:r="http://schemas.openxmlformats.org/officeDocument/2006/relationships" xmlns:c="http://schemas.openxmlformats.org/drawingml/2006/chart" xmlns:a="http://schemas.openxmlformats.org/drawingml/2006/main" xmlns:dgm="http://schemas.openxmlformats.org/drawingml/2006/diagram" xmlns:dsp="http://schemas.microsoft.com/office/drawing/2008/diagram" xmlns:p="http://schemas.openxmlformats.org/presentationml/2006/main">
+<file path=ppt/slides/slide10.xml><?xml version="1.0" encoding="utf-8"?>
+<p:sld xmlns:a="http://schemas.openxmlformats.org/drawingml/2006/main" xmlns:r="http://schemas.openxmlformats.org/officeDocument/2006/relationships" xmlns:p="http://schemas.openxmlformats.org/presentationml/2006/main">
   <p:cSld>
     <p:spTree>
       <p:nvGrpSpPr>
@@ -3812,116 +3832,55 @@
       </p:grpSpPr>
       <p:sp>
         <p:nvSpPr>
-          <p:cNvPr id="2" name="제목 1"/>
-          <p:cNvSpPr>
-            <a:spLocks noGrp="1"/>
-          </p:cNvSpPr>
-          <p:nvPr>
-            <p:ph type="title" idx="0"/>
-          </p:nvPr>
-        </p:nvSpPr>
-        <p:spPr/>
-        <p:txBody>
-          <a:bodyPr/>
-          <a:lstStyle/>
-          <a:p>
-            <a:pPr>
-              <a:defRPr/>
-            </a:pPr>
-            <a:r>
-              <a:rPr lang="en-US" altLang="ko-KR"/>
-              <a:t>todo</a:t>
-            </a:r>
-            <a:endParaRPr lang="en-US" altLang="ko-KR"/>
-          </a:p>
-        </p:txBody>
-      </p:sp>
-      <p:sp>
-        <p:nvSpPr>
-          <p:cNvPr id="3" name="내용 개체 틀 2"/>
-          <p:cNvSpPr>
-            <a:spLocks noGrp="1"/>
-          </p:cNvSpPr>
-          <p:nvPr>
-            <p:ph idx="1"/>
-          </p:nvPr>
-        </p:nvSpPr>
-        <p:spPr/>
-        <p:txBody>
-          <a:bodyPr/>
-          <a:lstStyle/>
-          <a:p>
-            <a:pPr>
-              <a:defRPr/>
-            </a:pPr>
-            <a:r>
-              <a:rPr lang="en-US" altLang="ko-KR"/>
-              <a:t>finish making ppt</a:t>
-            </a:r>
-            <a:endParaRPr lang="en-US" altLang="ko-KR"/>
-          </a:p>
-          <a:p>
-            <a:pPr>
-              <a:defRPr/>
-            </a:pPr>
-            <a:r>
-              <a:rPr lang="en-US" altLang="ko-KR"/>
-              <a:t>write script </a:t>
-            </a:r>
-            <a:endParaRPr lang="en-US" altLang="ko-KR"/>
-          </a:p>
-          <a:p>
-            <a:pPr>
-              <a:defRPr/>
-            </a:pPr>
-            <a:r>
-              <a:rPr lang="en-US" altLang="ko-KR"/>
-              <a:t>~11/29</a:t>
-            </a:r>
-            <a:endParaRPr lang="en-US" altLang="ko-KR"/>
-          </a:p>
-          <a:p>
-            <a:pPr>
-              <a:defRPr/>
-            </a:pPr>
-            <a:endParaRPr lang="en-US" altLang="ko-KR"/>
-          </a:p>
-          <a:p>
-            <a:pPr>
-              <a:defRPr/>
-            </a:pPr>
-            <a:endParaRPr lang="en-US" altLang="ko-KR"/>
-          </a:p>
-          <a:p>
-            <a:pPr>
-              <a:defRPr/>
-            </a:pPr>
-            <a:r>
-              <a:rPr lang="en-US" altLang="ko-KR"/>
-              <a:t>find video</a:t>
-            </a:r>
-            <a:endParaRPr lang="en-US" altLang="ko-KR"/>
+          <p:cNvPr id="2" name="제목 1">
+            <a:extLst>
+              <a:ext uri="{FF2B5EF4-FFF2-40B4-BE49-F238E27FC236}">
+                <a16:creationId xmlns:a16="http://schemas.microsoft.com/office/drawing/2014/main" id="{449FA6A7-7858-C11A-7C0F-99E1BF036A0E}"/>
+              </a:ext>
+            </a:extLst>
+          </p:cNvPr>
+          <p:cNvSpPr>
+            <a:spLocks noGrp="1"/>
+          </p:cNvSpPr>
+          <p:nvPr>
+            <p:ph type="title"/>
+          </p:nvPr>
+        </p:nvSpPr>
+        <p:spPr/>
+        <p:txBody>
+          <a:bodyPr/>
+          <a:lstStyle/>
+          <a:p>
+            <a:r>
+              <a:rPr lang="ko-KR" altLang="en-US" dirty="0"/>
+              <a:t>약 </a:t>
+            </a:r>
+            <a:r>
+              <a:rPr lang="en-US" altLang="ko-KR" dirty="0"/>
+              <a:t>500</a:t>
+            </a:r>
+            <a:r>
+              <a:rPr lang="ko-KR" altLang="en-US"/>
+              <a:t>장의 데이터</a:t>
+            </a:r>
           </a:p>
         </p:txBody>
       </p:sp>
     </p:spTree>
+    <p:extLst>
+      <p:ext uri="{BB962C8B-B14F-4D97-AF65-F5344CB8AC3E}">
+        <p14:creationId xmlns:p14="http://schemas.microsoft.com/office/powerpoint/2010/main" val="578261484"/>
+      </p:ext>
+    </p:extLst>
   </p:cSld>
   <p:clrMapOvr>
     <a:masterClrMapping/>
   </p:clrMapOvr>
-  <mc:AlternateContent xmlns:mc="http://schemas.openxmlformats.org/markup-compatibility/2006">
-    <mc:Choice xmlns:p14="http://schemas.microsoft.com/office/powerpoint/2010/main" Requires="p14">
-      <p:transition xmlns:mc="http://schemas.openxmlformats.org/markup-compatibility/2006" xmlns:p14="http://schemas.microsoft.com/office/powerpoint/2010/main" mc:Ignorable="p14" p14:dur="500"/>
-    </mc:Choice>
-    <mc:Fallback>
-      <p:transition/>
-    </mc:Fallback>
-  </mc:AlternateContent>
 </p:sld>
 </file>
 
-<file path=ppt/slides/slide3.xml><?xml version="1.0" encoding="utf-8"?>
-<p:sld xmlns:r="http://schemas.openxmlformats.org/officeDocument/2006/relationships" xmlns:c="http://schemas.openxmlformats.org/drawingml/2006/chart" xmlns:a="http://schemas.openxmlformats.org/drawingml/2006/main" xmlns:dgm="http://schemas.openxmlformats.org/drawingml/2006/diagram" xmlns:dsp="http://schemas.microsoft.com/office/drawing/2008/diagram" xmlns:p="http://schemas.openxmlformats.org/presentationml/2006/main">
+<file path=ppt/slides/slide2.xml><?xml version="1.0" encoding="utf-8"?>
+<p:sld xmlns:a="http://schemas.openxmlformats.org/drawingml/2006/main" xmlns:r="http://schemas.openxmlformats.org/officeDocument/2006/relationships" xmlns:p="http://schemas.openxmlformats.org/presentationml/2006/main">
   <p:cSld>
     <p:spTree>
       <p:nvGrpSpPr>
@@ -3944,7 +3903,7 @@
             <a:spLocks noGrp="1"/>
           </p:cNvSpPr>
           <p:nvPr>
-            <p:ph type="title" idx="0"/>
+            <p:ph type="title"/>
           </p:nvPr>
         </p:nvSpPr>
         <p:spPr/>
@@ -3957,9 +3916,8 @@
             </a:pPr>
             <a:r>
               <a:rPr lang="en-US" altLang="ko-KR"/>
-              <a:t>Content</a:t>
-            </a:r>
-            <a:endParaRPr lang="en-US" altLang="ko-KR"/>
+              <a:t>todo</a:t>
+            </a:r>
           </a:p>
         </p:txBody>
       </p:sp>
@@ -3975,175 +3933,55 @@
         </p:nvSpPr>
         <p:spPr/>
         <p:txBody>
-          <a:bodyPr>
-            <a:normAutofit lnSpcReduction="10000"/>
-          </a:bodyPr>
-          <a:lstStyle/>
-          <a:p>
-            <a:pPr marL="592000" indent="-592000">
-              <a:buAutoNum type="arabicPeriod"/>
+          <a:bodyPr/>
+          <a:lstStyle/>
+          <a:p>
+            <a:pPr>
               <a:defRPr/>
             </a:pPr>
             <a:r>
               <a:rPr lang="en-US" altLang="ko-KR"/>
-              <a:t>Project introduction : 30s~1m</a:t>
-            </a:r>
-            <a:r>
-              <a:rPr lang="ko-KR" altLang="en-US"/>
-              <a:t> </a:t>
-            </a:r>
-            <a:r>
-              <a:rPr lang="en-US" altLang="ko-KR"/>
-              <a:t>/</a:t>
-            </a:r>
-            <a:r>
-              <a:rPr lang="ko-KR" altLang="en-US"/>
-              <a:t>지은</a:t>
-            </a:r>
-            <a:endParaRPr lang="ko-KR" altLang="en-US"/>
-          </a:p>
-          <a:p>
-            <a:pPr marL="592000" indent="-592000">
-              <a:buAutoNum type="arabicPeriod"/>
+              <a:t>finish making ppt</a:t>
+            </a:r>
+          </a:p>
+          <a:p>
+            <a:pPr>
               <a:defRPr/>
             </a:pPr>
             <a:r>
               <a:rPr lang="en-US" altLang="ko-KR"/>
-              <a:t>What is YOLO? : 1~2m</a:t>
-            </a:r>
-            <a:r>
-              <a:rPr lang="ko-KR" altLang="en-US"/>
-              <a:t> </a:t>
-            </a:r>
-            <a:r>
-              <a:rPr lang="en-US" altLang="ko-KR"/>
-              <a:t>/</a:t>
-            </a:r>
-            <a:r>
-              <a:rPr lang="ko-KR" altLang="en-US"/>
-              <a:t> </a:t>
-            </a:r>
-            <a:r>
-              <a:rPr lang="en-US" altLang="ko-KR"/>
-              <a:t>paul </a:t>
-            </a:r>
-            <a:endParaRPr lang="ko-KR" altLang="en-US"/>
-          </a:p>
-          <a:p>
-            <a:pPr marL="592000" indent="-592000">
-              <a:buAutoNum type="arabicPeriod"/>
+              <a:t>write script </a:t>
+            </a:r>
+          </a:p>
+          <a:p>
+            <a:pPr>
               <a:defRPr/>
             </a:pPr>
             <a:r>
               <a:rPr lang="en-US" altLang="ko-KR"/>
-              <a:t>Reference Paper : 2m</a:t>
-            </a:r>
-            <a:r>
-              <a:rPr lang="ko-KR" altLang="en-US"/>
-              <a:t> </a:t>
-            </a:r>
-            <a:r>
-              <a:rPr lang="en-US" altLang="ko-KR"/>
-              <a:t>/</a:t>
-            </a:r>
-            <a:r>
-              <a:rPr lang="ko-KR" altLang="en-US"/>
-              <a:t>장호</a:t>
-            </a:r>
-            <a:endParaRPr lang="ko-KR" altLang="en-US"/>
-          </a:p>
-          <a:p>
-            <a:pPr marL="592000" indent="-592000">
-              <a:buAutoNum type="arabicPeriod"/>
-              <a:defRPr/>
-            </a:pPr>
-            <a:r>
-              <a:rPr lang="en-US" altLang="ko-KR"/>
-              <a:t>Data labeling : 1m /georg</a:t>
-            </a:r>
-            <a:r>
-              <a:rPr lang="ko-KR" altLang="en-US"/>
-              <a:t> </a:t>
-            </a:r>
-            <a:r>
-              <a:rPr lang="en-US" altLang="ko-KR"/>
-              <a:t>-&gt; upload labeling please</a:t>
-            </a:r>
-            <a:endParaRPr lang="en-US" altLang="ko-KR"/>
-          </a:p>
-          <a:p>
-            <a:pPr marL="592000" indent="-592000">
-              <a:buAutoNum type="arabicPeriod"/>
-              <a:defRPr/>
-            </a:pPr>
-            <a:r>
-              <a:rPr lang="en-US" altLang="ko-KR"/>
-              <a:t>Implementation : 2~3m</a:t>
-            </a:r>
-            <a:r>
-              <a:rPr lang="ko-KR" altLang="en-US"/>
-              <a:t> </a:t>
-            </a:r>
-            <a:r>
-              <a:rPr lang="en-US" altLang="ko-KR"/>
-              <a:t>/</a:t>
-            </a:r>
-            <a:r>
-              <a:rPr lang="ko-KR" altLang="en-US"/>
-              <a:t>주현</a:t>
-            </a:r>
-            <a:endParaRPr lang="ko-KR" altLang="en-US"/>
-          </a:p>
-          <a:p>
-            <a:pPr marL="592000" indent="-592000">
-              <a:buAutoNum type="arabicPeriod"/>
-              <a:defRPr/>
-            </a:pPr>
-            <a:r>
-              <a:rPr lang="en-US" altLang="ko-KR"/>
-              <a:t>Result : 1~2m</a:t>
-            </a:r>
-            <a:r>
-              <a:rPr lang="ko-KR" altLang="en-US"/>
-              <a:t> </a:t>
-            </a:r>
-            <a:r>
-              <a:rPr lang="en-US" altLang="ko-KR"/>
-              <a:t>/</a:t>
-            </a:r>
-            <a:r>
-              <a:rPr lang="ko-KR" altLang="en-US"/>
-              <a:t>지은</a:t>
-            </a:r>
-            <a:endParaRPr lang="ko-KR" altLang="en-US"/>
-          </a:p>
-          <a:p>
-            <a:pPr marL="592000" indent="-592000">
-              <a:buAutoNum type="arabicPeriod"/>
+              <a:t>~11/29</a:t>
+            </a:r>
+          </a:p>
+          <a:p>
+            <a:pPr>
               <a:defRPr/>
             </a:pPr>
             <a:endParaRPr lang="en-US" altLang="ko-KR"/>
           </a:p>
           <a:p>
-            <a:pPr marL="592000" indent="-592000">
-              <a:buAutoNum type="arabicPeriod"/>
+            <a:pPr>
               <a:defRPr/>
             </a:pPr>
             <a:endParaRPr lang="en-US" altLang="ko-KR"/>
           </a:p>
           <a:p>
-            <a:pPr marL="592000" indent="-592000">
-              <a:buAutoNum type="arabicPeriod"/>
+            <a:pPr>
               <a:defRPr/>
             </a:pPr>
-            <a:endParaRPr lang="en-US" altLang="ko-KR"/>
-          </a:p>
-          <a:p>
-            <a:pPr marL="592000" indent="-592000">
-              <a:buAutoNum type="arabicPeriod"/>
-              <a:defRPr/>
-            </a:pPr>
-            <a:endParaRPr lang="en-US" altLang="ko-KR"/>
+            <a:r>
+              <a:rPr lang="en-US" altLang="ko-KR"/>
+              <a:t>find video</a:t>
+            </a:r>
           </a:p>
         </p:txBody>
       </p:sp>
@@ -4152,19 +3990,19 @@
   <p:clrMapOvr>
     <a:masterClrMapping/>
   </p:clrMapOvr>
-  <mc:AlternateContent xmlns:mc="http://schemas.openxmlformats.org/markup-compatibility/2006">
-    <mc:Choice xmlns:p14="http://schemas.microsoft.com/office/powerpoint/2010/main" Requires="p14">
-      <p:transition xmlns:mc="http://schemas.openxmlformats.org/markup-compatibility/2006" xmlns:p14="http://schemas.microsoft.com/office/powerpoint/2010/main" mc:Ignorable="p14" p14:dur="500"/>
+  <mc:AlternateContent xmlns:mc="http://schemas.openxmlformats.org/markup-compatibility/2006" xmlns:p14="http://schemas.microsoft.com/office/powerpoint/2010/main">
+    <mc:Choice Requires="p14">
+      <p:transition/>
     </mc:Choice>
-    <mc:Fallback>
+    <mc:Fallback xmlns:dsp="http://schemas.microsoft.com/office/drawing/2008/diagram" xmlns:dgm="http://schemas.openxmlformats.org/drawingml/2006/diagram" xmlns:c="http://schemas.openxmlformats.org/drawingml/2006/chart" xmlns="">
       <p:transition/>
     </mc:Fallback>
   </mc:AlternateContent>
 </p:sld>
 </file>
 
-<file path=ppt/slides/slide4.xml><?xml version="1.0" encoding="utf-8"?>
-<p:sld xmlns:r="http://schemas.openxmlformats.org/officeDocument/2006/relationships" xmlns:c="http://schemas.openxmlformats.org/drawingml/2006/chart" xmlns:a="http://schemas.openxmlformats.org/drawingml/2006/main" xmlns:dgm="http://schemas.openxmlformats.org/drawingml/2006/diagram" xmlns:dsp="http://schemas.microsoft.com/office/drawing/2008/diagram" xmlns:p="http://schemas.openxmlformats.org/presentationml/2006/main">
+<file path=ppt/slides/slide3.xml><?xml version="1.0" encoding="utf-8"?>
+<p:sld xmlns:a="http://schemas.openxmlformats.org/drawingml/2006/main" xmlns:r="http://schemas.openxmlformats.org/officeDocument/2006/relationships" xmlns:p="http://schemas.openxmlformats.org/presentationml/2006/main">
   <p:cSld>
     <p:spTree>
       <p:nvGrpSpPr>
@@ -4187,12 +4025,39 @@
             <a:spLocks noGrp="1"/>
           </p:cNvSpPr>
           <p:nvPr>
-            <p:ph type="title" idx="0"/>
-          </p:nvPr>
-        </p:nvSpPr>
-        <p:spPr/>
-        <p:txBody>
-          <a:bodyPr/>
+            <p:ph type="title"/>
+          </p:nvPr>
+        </p:nvSpPr>
+        <p:spPr/>
+        <p:txBody>
+          <a:bodyPr/>
+          <a:lstStyle/>
+          <a:p>
+            <a:pPr>
+              <a:defRPr/>
+            </a:pPr>
+            <a:r>
+              <a:rPr lang="en-US" altLang="ko-KR"/>
+              <a:t>Content</a:t>
+            </a:r>
+          </a:p>
+        </p:txBody>
+      </p:sp>
+      <p:sp>
+        <p:nvSpPr>
+          <p:cNvPr id="3" name="내용 개체 틀 2"/>
+          <p:cNvSpPr>
+            <a:spLocks noGrp="1"/>
+          </p:cNvSpPr>
+          <p:nvPr>
+            <p:ph idx="1"/>
+          </p:nvPr>
+        </p:nvSpPr>
+        <p:spPr/>
+        <p:txBody>
+          <a:bodyPr>
+            <a:normAutofit/>
+          </a:bodyPr>
           <a:lstStyle/>
           <a:p>
             <a:pPr marL="592000" indent="-592000">
@@ -4201,34 +4066,158 @@
             </a:pPr>
             <a:r>
               <a:rPr lang="en-US" altLang="ko-KR"/>
-              <a:t>Project introduction</a:t>
-            </a:r>
-            <a:endParaRPr lang="ko-KR" altLang="en-US"/>
-          </a:p>
-        </p:txBody>
-      </p:sp>
-      <p:sp>
-        <p:nvSpPr>
-          <p:cNvPr id="3" name="내용 개체 틀 2"/>
-          <p:cNvSpPr>
-            <a:spLocks noGrp="1"/>
-          </p:cNvSpPr>
-          <p:nvPr>
-            <p:ph idx="1"/>
-          </p:nvPr>
-        </p:nvSpPr>
-        <p:spPr/>
-        <p:txBody>
-          <a:bodyPr/>
-          <a:lstStyle/>
-          <a:p>
-            <a:pPr>
+              <a:t>Project introduction : 30s~1m</a:t>
+            </a:r>
+            <a:r>
+              <a:rPr lang="ko-KR" altLang="en-US"/>
+              <a:t> </a:t>
+            </a:r>
+            <a:r>
+              <a:rPr lang="en-US" altLang="ko-KR"/>
+              <a:t>/</a:t>
+            </a:r>
+            <a:r>
+              <a:rPr lang="ko-KR" altLang="en-US"/>
+              <a:t>지은</a:t>
+            </a:r>
+          </a:p>
+          <a:p>
+            <a:pPr marL="592000" indent="-592000">
+              <a:buAutoNum type="arabicPeriod"/>
               <a:defRPr/>
             </a:pPr>
             <a:r>
               <a:rPr lang="en-US" altLang="ko-KR"/>
-              <a:t>traffic classification~~~</a:t>
-            </a:r>
+              <a:t>What is YOLO? : 1~2m</a:t>
+            </a:r>
+            <a:r>
+              <a:rPr lang="ko-KR" altLang="en-US"/>
+              <a:t> </a:t>
+            </a:r>
+            <a:r>
+              <a:rPr lang="en-US" altLang="ko-KR"/>
+              <a:t>/</a:t>
+            </a:r>
+            <a:r>
+              <a:rPr lang="ko-KR" altLang="en-US"/>
+              <a:t> </a:t>
+            </a:r>
+            <a:r>
+              <a:rPr lang="en-US" altLang="ko-KR"/>
+              <a:t>paul </a:t>
+            </a:r>
+            <a:endParaRPr lang="ko-KR" altLang="en-US"/>
+          </a:p>
+          <a:p>
+            <a:pPr marL="592000" indent="-592000">
+              <a:buAutoNum type="arabicPeriod"/>
+              <a:defRPr/>
+            </a:pPr>
+            <a:r>
+              <a:rPr lang="en-US" altLang="ko-KR"/>
+              <a:t>Reference Paper : 2m</a:t>
+            </a:r>
+            <a:r>
+              <a:rPr lang="ko-KR" altLang="en-US"/>
+              <a:t> </a:t>
+            </a:r>
+            <a:r>
+              <a:rPr lang="en-US" altLang="ko-KR"/>
+              <a:t>/</a:t>
+            </a:r>
+            <a:r>
+              <a:rPr lang="ko-KR" altLang="en-US"/>
+              <a:t>장호</a:t>
+            </a:r>
+          </a:p>
+          <a:p>
+            <a:pPr marL="592000" indent="-592000">
+              <a:buAutoNum type="arabicPeriod"/>
+              <a:defRPr/>
+            </a:pPr>
+            <a:r>
+              <a:rPr lang="en-US" altLang="ko-KR"/>
+              <a:t>Data labeling : 1m /georg</a:t>
+            </a:r>
+            <a:r>
+              <a:rPr lang="ko-KR" altLang="en-US"/>
+              <a:t> </a:t>
+            </a:r>
+            <a:r>
+              <a:rPr lang="en-US" altLang="ko-KR"/>
+              <a:t>-&gt; upload labeling please</a:t>
+            </a:r>
+          </a:p>
+          <a:p>
+            <a:pPr marL="592000" indent="-592000">
+              <a:buAutoNum type="arabicPeriod"/>
+              <a:defRPr/>
+            </a:pPr>
+            <a:r>
+              <a:rPr lang="en-US" altLang="ko-KR"/>
+              <a:t>Implementation : 2~3m</a:t>
+            </a:r>
+            <a:r>
+              <a:rPr lang="ko-KR" altLang="en-US"/>
+              <a:t> </a:t>
+            </a:r>
+            <a:r>
+              <a:rPr lang="en-US" altLang="ko-KR"/>
+              <a:t>/</a:t>
+            </a:r>
+            <a:r>
+              <a:rPr lang="ko-KR" altLang="en-US"/>
+              <a:t>주현</a:t>
+            </a:r>
+          </a:p>
+          <a:p>
+            <a:pPr marL="592000" indent="-592000">
+              <a:buAutoNum type="arabicPeriod"/>
+              <a:defRPr/>
+            </a:pPr>
+            <a:r>
+              <a:rPr lang="en-US" altLang="ko-KR"/>
+              <a:t>Result : 1~2m</a:t>
+            </a:r>
+            <a:r>
+              <a:rPr lang="ko-KR" altLang="en-US"/>
+              <a:t> </a:t>
+            </a:r>
+            <a:r>
+              <a:rPr lang="en-US" altLang="ko-KR"/>
+              <a:t>/</a:t>
+            </a:r>
+            <a:r>
+              <a:rPr lang="ko-KR" altLang="en-US"/>
+              <a:t>지은</a:t>
+            </a:r>
+          </a:p>
+          <a:p>
+            <a:pPr marL="592000" indent="-592000">
+              <a:buAutoNum type="arabicPeriod"/>
+              <a:defRPr/>
+            </a:pPr>
+            <a:endParaRPr lang="en-US" altLang="ko-KR"/>
+          </a:p>
+          <a:p>
+            <a:pPr marL="592000" indent="-592000">
+              <a:buAutoNum type="arabicPeriod"/>
+              <a:defRPr/>
+            </a:pPr>
+            <a:endParaRPr lang="en-US" altLang="ko-KR"/>
+          </a:p>
+          <a:p>
+            <a:pPr marL="592000" indent="-592000">
+              <a:buAutoNum type="arabicPeriod"/>
+              <a:defRPr/>
+            </a:pPr>
+            <a:endParaRPr lang="en-US" altLang="ko-KR"/>
+          </a:p>
+          <a:p>
+            <a:pPr marL="592000" indent="-592000">
+              <a:buAutoNum type="arabicPeriod"/>
+              <a:defRPr/>
+            </a:pPr>
             <a:endParaRPr lang="en-US" altLang="ko-KR"/>
           </a:p>
         </p:txBody>
@@ -4238,19 +4227,19 @@
   <p:clrMapOvr>
     <a:masterClrMapping/>
   </p:clrMapOvr>
-  <mc:AlternateContent xmlns:mc="http://schemas.openxmlformats.org/markup-compatibility/2006">
-    <mc:Choice xmlns:p14="http://schemas.microsoft.com/office/powerpoint/2010/main" Requires="p14">
-      <p:transition xmlns:mc="http://schemas.openxmlformats.org/markup-compatibility/2006" xmlns:p14="http://schemas.microsoft.com/office/powerpoint/2010/main" mc:Ignorable="p14" p14:dur="500"/>
+  <mc:AlternateContent xmlns:mc="http://schemas.openxmlformats.org/markup-compatibility/2006" xmlns:p14="http://schemas.microsoft.com/office/powerpoint/2010/main">
+    <mc:Choice Requires="p14">
+      <p:transition/>
     </mc:Choice>
-    <mc:Fallback>
+    <mc:Fallback xmlns:dsp="http://schemas.microsoft.com/office/drawing/2008/diagram" xmlns:dgm="http://schemas.openxmlformats.org/drawingml/2006/diagram" xmlns:c="http://schemas.openxmlformats.org/drawingml/2006/chart" xmlns="">
       <p:transition/>
     </mc:Fallback>
   </mc:AlternateContent>
 </p:sld>
 </file>
 
-<file path=ppt/slides/slide5.xml><?xml version="1.0" encoding="utf-8"?>
-<p:sld xmlns:r="http://schemas.openxmlformats.org/officeDocument/2006/relationships" xmlns:c="http://schemas.openxmlformats.org/drawingml/2006/chart" xmlns:a="http://schemas.openxmlformats.org/drawingml/2006/main" xmlns:dgm="http://schemas.openxmlformats.org/drawingml/2006/diagram" xmlns:dsp="http://schemas.microsoft.com/office/drawing/2008/diagram" xmlns:p="http://schemas.openxmlformats.org/presentationml/2006/main">
+<file path=ppt/slides/slide4.xml><?xml version="1.0" encoding="utf-8"?>
+<p:sld xmlns:a="http://schemas.openxmlformats.org/drawingml/2006/main" xmlns:r="http://schemas.openxmlformats.org/officeDocument/2006/relationships" xmlns:p="http://schemas.openxmlformats.org/presentationml/2006/main">
   <p:cSld>
     <p:spTree>
       <p:nvGrpSpPr>
@@ -4273,23 +4262,23 @@
             <a:spLocks noGrp="1"/>
           </p:cNvSpPr>
           <p:nvPr>
-            <p:ph type="title" idx="0"/>
-          </p:nvPr>
-        </p:nvSpPr>
-        <p:spPr/>
-        <p:txBody>
-          <a:bodyPr/>
-          <a:lstStyle/>
-          <a:p>
-            <a:pPr marL="0" indent="0">
-              <a:buNone/>
+            <p:ph type="title"/>
+          </p:nvPr>
+        </p:nvSpPr>
+        <p:spPr/>
+        <p:txBody>
+          <a:bodyPr/>
+          <a:lstStyle/>
+          <a:p>
+            <a:pPr marL="592000" indent="-592000">
+              <a:buAutoNum type="arabicPeriod"/>
               <a:defRPr/>
             </a:pPr>
             <a:r>
               <a:rPr lang="en-US" altLang="ko-KR"/>
-              <a:t>2. What is YOLO?</a:t>
-            </a:r>
-            <a:endParaRPr lang="en-US" altLang="ko-KR"/>
+              <a:t>Project introduction</a:t>
+            </a:r>
+            <a:endParaRPr lang="ko-KR" altLang="en-US"/>
           </a:p>
         </p:txBody>
       </p:sp>
@@ -4313,19 +4302,8 @@
             </a:pPr>
             <a:r>
               <a:rPr lang="en-US" altLang="ko-KR"/>
-              <a:t>explain yolo~~</a:t>
-            </a:r>
-            <a:endParaRPr lang="en-US" altLang="ko-KR"/>
-          </a:p>
-          <a:p>
-            <a:pPr>
-              <a:defRPr/>
-            </a:pPr>
-            <a:r>
-              <a:rPr lang="en-US" altLang="ko-KR"/>
-              <a:t>compare with other models</a:t>
-            </a:r>
-            <a:endParaRPr lang="en-US" altLang="ko-KR"/>
+              <a:t>traffic classification~~~</a:t>
+            </a:r>
           </a:p>
         </p:txBody>
       </p:sp>
@@ -4334,19 +4312,19 @@
   <p:clrMapOvr>
     <a:masterClrMapping/>
   </p:clrMapOvr>
-  <mc:AlternateContent xmlns:mc="http://schemas.openxmlformats.org/markup-compatibility/2006">
-    <mc:Choice xmlns:p14="http://schemas.microsoft.com/office/powerpoint/2010/main" Requires="p14">
-      <p:transition xmlns:mc="http://schemas.openxmlformats.org/markup-compatibility/2006" xmlns:p14="http://schemas.microsoft.com/office/powerpoint/2010/main" mc:Ignorable="p14" p14:dur="500"/>
+  <mc:AlternateContent xmlns:mc="http://schemas.openxmlformats.org/markup-compatibility/2006" xmlns:p14="http://schemas.microsoft.com/office/powerpoint/2010/main">
+    <mc:Choice Requires="p14">
+      <p:transition/>
     </mc:Choice>
-    <mc:Fallback>
+    <mc:Fallback xmlns:dsp="http://schemas.microsoft.com/office/drawing/2008/diagram" xmlns:dgm="http://schemas.openxmlformats.org/drawingml/2006/diagram" xmlns:c="http://schemas.openxmlformats.org/drawingml/2006/chart" xmlns="">
       <p:transition/>
     </mc:Fallback>
   </mc:AlternateContent>
 </p:sld>
 </file>
 
-<file path=ppt/slides/slide6.xml><?xml version="1.0" encoding="utf-8"?>
-<p:sld xmlns:r="http://schemas.openxmlformats.org/officeDocument/2006/relationships" xmlns:c="http://schemas.openxmlformats.org/drawingml/2006/chart" xmlns:a="http://schemas.openxmlformats.org/drawingml/2006/main" xmlns:dgm="http://schemas.openxmlformats.org/drawingml/2006/diagram" xmlns:dsp="http://schemas.microsoft.com/office/drawing/2008/diagram" xmlns:p="http://schemas.openxmlformats.org/presentationml/2006/main">
+<file path=ppt/slides/slide5.xml><?xml version="1.0" encoding="utf-8"?>
+<p:sld xmlns:a="http://schemas.openxmlformats.org/drawingml/2006/main" xmlns:r="http://schemas.openxmlformats.org/officeDocument/2006/relationships" xmlns:p="http://schemas.openxmlformats.org/presentationml/2006/main">
   <p:cSld>
     <p:spTree>
       <p:nvGrpSpPr>
@@ -4369,7 +4347,7 @@
             <a:spLocks noGrp="1"/>
           </p:cNvSpPr>
           <p:nvPr>
-            <p:ph type="title" idx="0"/>
+            <p:ph type="title"/>
           </p:nvPr>
         </p:nvSpPr>
         <p:spPr/>
@@ -4383,9 +4361,8 @@
             </a:pPr>
             <a:r>
               <a:rPr lang="en-US" altLang="ko-KR"/>
-              <a:t>3. Reference Paper</a:t>
-            </a:r>
-            <a:endParaRPr lang="en-US" altLang="ko-KR"/>
+              <a:t>2. What is YOLO?</a:t>
+            </a:r>
           </a:p>
         </p:txBody>
       </p:sp>
@@ -4409,9 +4386,17 @@
             </a:pPr>
             <a:r>
               <a:rPr lang="en-US" altLang="ko-KR"/>
-              <a:t>https://ieeexplore.ieee.org/document/8649887</a:t>
-            </a:r>
-            <a:endParaRPr lang="ko-KR" altLang="en-US"/>
+              <a:t>explain yolo~~</a:t>
+            </a:r>
+          </a:p>
+          <a:p>
+            <a:pPr>
+              <a:defRPr/>
+            </a:pPr>
+            <a:r>
+              <a:rPr lang="en-US" altLang="ko-KR"/>
+              <a:t>compare with other models</a:t>
+            </a:r>
           </a:p>
         </p:txBody>
       </p:sp>
@@ -4420,19 +4405,19 @@
   <p:clrMapOvr>
     <a:masterClrMapping/>
   </p:clrMapOvr>
-  <mc:AlternateContent xmlns:mc="http://schemas.openxmlformats.org/markup-compatibility/2006">
-    <mc:Choice xmlns:p14="http://schemas.microsoft.com/office/powerpoint/2010/main" Requires="p14">
-      <p:transition xmlns:mc="http://schemas.openxmlformats.org/markup-compatibility/2006" xmlns:p14="http://schemas.microsoft.com/office/powerpoint/2010/main" mc:Ignorable="p14" p14:dur="500"/>
+  <mc:AlternateContent xmlns:mc="http://schemas.openxmlformats.org/markup-compatibility/2006" xmlns:p14="http://schemas.microsoft.com/office/powerpoint/2010/main">
+    <mc:Choice Requires="p14">
+      <p:transition/>
     </mc:Choice>
-    <mc:Fallback>
+    <mc:Fallback xmlns:dsp="http://schemas.microsoft.com/office/drawing/2008/diagram" xmlns:dgm="http://schemas.openxmlformats.org/drawingml/2006/diagram" xmlns:c="http://schemas.openxmlformats.org/drawingml/2006/chart" xmlns="">
       <p:transition/>
     </mc:Fallback>
   </mc:AlternateContent>
 </p:sld>
 </file>
 
-<file path=ppt/slides/slide7.xml><?xml version="1.0" encoding="utf-8"?>
-<p:sld xmlns:r="http://schemas.openxmlformats.org/officeDocument/2006/relationships" xmlns:c="http://schemas.openxmlformats.org/drawingml/2006/chart" xmlns:a="http://schemas.openxmlformats.org/drawingml/2006/main" xmlns:dgm="http://schemas.openxmlformats.org/drawingml/2006/diagram" xmlns:dsp="http://schemas.microsoft.com/office/drawing/2008/diagram" xmlns:p="http://schemas.openxmlformats.org/presentationml/2006/main">
+<file path=ppt/slides/slide6.xml><?xml version="1.0" encoding="utf-8"?>
+<p:sld xmlns:a="http://schemas.openxmlformats.org/drawingml/2006/main" xmlns:r="http://schemas.openxmlformats.org/officeDocument/2006/relationships" xmlns:p="http://schemas.openxmlformats.org/presentationml/2006/main">
   <p:cSld>
     <p:spTree>
       <p:nvGrpSpPr>
@@ -4455,7 +4440,7 @@
             <a:spLocks noGrp="1"/>
           </p:cNvSpPr>
           <p:nvPr>
-            <p:ph type="title" idx="0"/>
+            <p:ph type="title"/>
           </p:nvPr>
         </p:nvSpPr>
         <p:spPr/>
@@ -4469,9 +4454,8 @@
             </a:pPr>
             <a:r>
               <a:rPr lang="en-US" altLang="ko-KR"/>
-              <a:t>4. Data labeling</a:t>
-            </a:r>
-            <a:endParaRPr lang="en-US" altLang="ko-KR"/>
+              <a:t>3. Reference Paper</a:t>
+            </a:r>
           </a:p>
         </p:txBody>
       </p:sp>
@@ -4494,16 +4478,100 @@
               <a:defRPr/>
             </a:pPr>
             <a:r>
+              <a:rPr lang="en-US" altLang="ko-KR"/>
+              <a:t>https://ieeexplore.ieee.org/document/8649887</a:t>
+            </a:r>
+            <a:endParaRPr lang="ko-KR" altLang="en-US"/>
+          </a:p>
+        </p:txBody>
+      </p:sp>
+    </p:spTree>
+  </p:cSld>
+  <p:clrMapOvr>
+    <a:masterClrMapping/>
+  </p:clrMapOvr>
+  <mc:AlternateContent xmlns:mc="http://schemas.openxmlformats.org/markup-compatibility/2006" xmlns:p14="http://schemas.microsoft.com/office/powerpoint/2010/main">
+    <mc:Choice Requires="p14">
+      <p:transition/>
+    </mc:Choice>
+    <mc:Fallback xmlns:dsp="http://schemas.microsoft.com/office/drawing/2008/diagram" xmlns:dgm="http://schemas.openxmlformats.org/drawingml/2006/diagram" xmlns:c="http://schemas.openxmlformats.org/drawingml/2006/chart" xmlns="">
+      <p:transition/>
+    </mc:Fallback>
+  </mc:AlternateContent>
+</p:sld>
+</file>
+
+<file path=ppt/slides/slide7.xml><?xml version="1.0" encoding="utf-8"?>
+<p:sld xmlns:a="http://schemas.openxmlformats.org/drawingml/2006/main" xmlns:r="http://schemas.openxmlformats.org/officeDocument/2006/relationships" xmlns:p="http://schemas.openxmlformats.org/presentationml/2006/main">
+  <p:cSld>
+    <p:spTree>
+      <p:nvGrpSpPr>
+        <p:cNvPr id="1" name=""/>
+        <p:cNvGrpSpPr/>
+        <p:nvPr/>
+      </p:nvGrpSpPr>
+      <p:grpSpPr>
+        <a:xfrm>
+          <a:off x="0" y="0"/>
+          <a:ext cx="0" cy="0"/>
+          <a:chOff x="0" y="0"/>
+          <a:chExt cx="0" cy="0"/>
+        </a:xfrm>
+      </p:grpSpPr>
+      <p:sp>
+        <p:nvSpPr>
+          <p:cNvPr id="2" name="제목 1"/>
+          <p:cNvSpPr>
+            <a:spLocks noGrp="1"/>
+          </p:cNvSpPr>
+          <p:nvPr>
+            <p:ph type="title"/>
+          </p:nvPr>
+        </p:nvSpPr>
+        <p:spPr/>
+        <p:txBody>
+          <a:bodyPr/>
+          <a:lstStyle/>
+          <a:p>
+            <a:pPr marL="0" indent="0">
+              <a:buNone/>
+              <a:defRPr/>
+            </a:pPr>
+            <a:r>
+              <a:rPr lang="en-US" altLang="ko-KR"/>
+              <a:t>4. Data labeling</a:t>
+            </a:r>
+          </a:p>
+        </p:txBody>
+      </p:sp>
+      <p:sp>
+        <p:nvSpPr>
+          <p:cNvPr id="3" name="내용 개체 틀 2"/>
+          <p:cNvSpPr>
+            <a:spLocks noGrp="1"/>
+          </p:cNvSpPr>
+          <p:nvPr>
+            <p:ph idx="1"/>
+          </p:nvPr>
+        </p:nvSpPr>
+        <p:spPr/>
+        <p:txBody>
+          <a:bodyPr/>
+          <a:lstStyle/>
+          <a:p>
+            <a:pPr>
+              <a:defRPr/>
+            </a:pPr>
+            <a:r>
               <a:rPr lang="en-US" altLang="ko-KR" sz="2000"/>
               <a:t>https://hc.hanyang.ac.kr/web/dslab/dataset?p_p_id=20&amp;p_p_lifecycle=0&amp;p_p_state=normal&amp;p_p_mode=view&amp;p_p_col_id=column-1&amp;p_p_col_count=1&amp;_20_struts_action=%2Fdocument_library%2Fview&amp;_20_folderId=365651</a:t>
             </a:r>
-            <a:endParaRPr lang="en-US" altLang="ko-KR" sz="2000"/>
           </a:p>
         </p:txBody>
       </p:sp>
       <p:pic>
         <p:nvPicPr>
-          <p:cNvPr id="4" name=""/>
+          <p:cNvPr id="4" name="그림 3"/>
           <p:cNvPicPr>
             <a:picLocks noChangeAspect="1"/>
           </p:cNvPicPr>
@@ -4530,11 +4598,11 @@
   <p:clrMapOvr>
     <a:masterClrMapping/>
   </p:clrMapOvr>
-  <mc:AlternateContent xmlns:mc="http://schemas.openxmlformats.org/markup-compatibility/2006">
-    <mc:Choice xmlns:p14="http://schemas.microsoft.com/office/powerpoint/2010/main" Requires="p14">
-      <p:transition xmlns:mc="http://schemas.openxmlformats.org/markup-compatibility/2006" xmlns:p14="http://schemas.microsoft.com/office/powerpoint/2010/main" mc:Ignorable="p14" p14:dur="500"/>
+  <mc:AlternateContent xmlns:mc="http://schemas.openxmlformats.org/markup-compatibility/2006" xmlns:p14="http://schemas.microsoft.com/office/powerpoint/2010/main">
+    <mc:Choice Requires="p14">
+      <p:transition/>
     </mc:Choice>
-    <mc:Fallback>
+    <mc:Fallback xmlns:dsp="http://schemas.microsoft.com/office/drawing/2008/diagram" xmlns:dgm="http://schemas.openxmlformats.org/drawingml/2006/diagram" xmlns:c="http://schemas.openxmlformats.org/drawingml/2006/chart" xmlns="">
       <p:transition/>
     </mc:Fallback>
   </mc:AlternateContent>
@@ -4542,7 +4610,7 @@
 </file>
 
 <file path=ppt/slides/slide8.xml><?xml version="1.0" encoding="utf-8"?>
-<p:sld xmlns:r="http://schemas.openxmlformats.org/officeDocument/2006/relationships" xmlns:c="http://schemas.openxmlformats.org/drawingml/2006/chart" xmlns:a="http://schemas.openxmlformats.org/drawingml/2006/main" xmlns:dgm="http://schemas.openxmlformats.org/drawingml/2006/diagram" xmlns:dsp="http://schemas.microsoft.com/office/drawing/2008/diagram" xmlns:p="http://schemas.openxmlformats.org/presentationml/2006/main">
+<p:sld xmlns:a="http://schemas.openxmlformats.org/drawingml/2006/main" xmlns:r="http://schemas.openxmlformats.org/officeDocument/2006/relationships" xmlns:p="http://schemas.openxmlformats.org/presentationml/2006/main">
   <p:cSld>
     <p:spTree>
       <p:nvGrpSpPr>
@@ -4565,7 +4633,7 @@
             <a:spLocks noGrp="1"/>
           </p:cNvSpPr>
           <p:nvPr>
-            <p:ph type="title" idx="0"/>
+            <p:ph type="title"/>
           </p:nvPr>
         </p:nvSpPr>
         <p:spPr/>
@@ -4581,7 +4649,6 @@
               <a:rPr lang="en-US" altLang="ko-KR"/>
               <a:t>5. Implementation</a:t>
             </a:r>
-            <a:endParaRPr lang="en-US" altLang="ko-KR"/>
           </a:p>
         </p:txBody>
       </p:sp>
@@ -4607,7 +4674,6 @@
               <a:rPr lang="en-US" altLang="ko-KR"/>
               <a:t>core code</a:t>
             </a:r>
-            <a:endParaRPr lang="en-US" altLang="ko-KR"/>
           </a:p>
         </p:txBody>
       </p:sp>
@@ -4616,11 +4682,11 @@
   <p:clrMapOvr>
     <a:masterClrMapping/>
   </p:clrMapOvr>
-  <mc:AlternateContent xmlns:mc="http://schemas.openxmlformats.org/markup-compatibility/2006">
-    <mc:Choice xmlns:p14="http://schemas.microsoft.com/office/powerpoint/2010/main" Requires="p14">
-      <p:transition xmlns:mc="http://schemas.openxmlformats.org/markup-compatibility/2006" xmlns:p14="http://schemas.microsoft.com/office/powerpoint/2010/main" mc:Ignorable="p14" p14:dur="500"/>
+  <mc:AlternateContent xmlns:mc="http://schemas.openxmlformats.org/markup-compatibility/2006" xmlns:p14="http://schemas.microsoft.com/office/powerpoint/2010/main">
+    <mc:Choice Requires="p14">
+      <p:transition/>
     </mc:Choice>
-    <mc:Fallback>
+    <mc:Fallback xmlns:dsp="http://schemas.microsoft.com/office/drawing/2008/diagram" xmlns:dgm="http://schemas.openxmlformats.org/drawingml/2006/diagram" xmlns:c="http://schemas.openxmlformats.org/drawingml/2006/chart" xmlns="">
       <p:transition/>
     </mc:Fallback>
   </mc:AlternateContent>
@@ -4628,7 +4694,7 @@
 </file>
 
 <file path=ppt/slides/slide9.xml><?xml version="1.0" encoding="utf-8"?>
-<p:sld xmlns:r="http://schemas.openxmlformats.org/officeDocument/2006/relationships" xmlns:c="http://schemas.openxmlformats.org/drawingml/2006/chart" xmlns:a="http://schemas.openxmlformats.org/drawingml/2006/main" xmlns:dgm="http://schemas.openxmlformats.org/drawingml/2006/diagram" xmlns:dsp="http://schemas.microsoft.com/office/drawing/2008/diagram" xmlns:p="http://schemas.openxmlformats.org/presentationml/2006/main">
+<p:sld xmlns:a="http://schemas.openxmlformats.org/drawingml/2006/main" xmlns:r="http://schemas.openxmlformats.org/officeDocument/2006/relationships" xmlns:p="http://schemas.openxmlformats.org/presentationml/2006/main">
   <p:cSld>
     <p:spTree>
       <p:nvGrpSpPr>
@@ -4651,7 +4717,7 @@
             <a:spLocks noGrp="1"/>
           </p:cNvSpPr>
           <p:nvPr>
-            <p:ph type="title" idx="0"/>
+            <p:ph type="title"/>
           </p:nvPr>
         </p:nvSpPr>
         <p:spPr/>
@@ -4667,7 +4733,6 @@
               <a:rPr lang="en-US" altLang="ko-KR"/>
               <a:t>6. Result </a:t>
             </a:r>
-            <a:endParaRPr lang="en-US" altLang="ko-KR"/>
           </a:p>
         </p:txBody>
       </p:sp>
@@ -4690,10 +4755,9 @@
               <a:defRPr/>
             </a:pPr>
             <a:r>
-              <a:rPr lang="en-US" altLang="ko-KR"/>
+              <a:rPr lang="en-US" altLang="ko-KR" dirty="0"/>
               <a:t>accuracy</a:t>
             </a:r>
-            <a:endParaRPr lang="en-US" altLang="ko-KR"/>
           </a:p>
         </p:txBody>
       </p:sp>
@@ -4702,11 +4766,11 @@
   <p:clrMapOvr>
     <a:masterClrMapping/>
   </p:clrMapOvr>
-  <mc:AlternateContent xmlns:mc="http://schemas.openxmlformats.org/markup-compatibility/2006">
-    <mc:Choice xmlns:p14="http://schemas.microsoft.com/office/powerpoint/2010/main" Requires="p14">
-      <p:transition xmlns:mc="http://schemas.openxmlformats.org/markup-compatibility/2006" xmlns:p14="http://schemas.microsoft.com/office/powerpoint/2010/main" mc:Ignorable="p14" p14:dur="500"/>
+  <mc:AlternateContent xmlns:mc="http://schemas.openxmlformats.org/markup-compatibility/2006" xmlns:p14="http://schemas.microsoft.com/office/powerpoint/2010/main">
+    <mc:Choice Requires="p14">
+      <p:transition/>
     </mc:Choice>
-    <mc:Fallback>
+    <mc:Fallback xmlns:dsp="http://schemas.microsoft.com/office/drawing/2008/diagram" xmlns:dgm="http://schemas.openxmlformats.org/drawingml/2006/diagram" xmlns:c="http://schemas.openxmlformats.org/drawingml/2006/chart" xmlns="">
       <p:transition/>
     </mc:Fallback>
   </mc:AlternateContent>
@@ -4714,41 +4778,41 @@
 </file>
 
 <file path=ppt/theme/theme1.xml><?xml version="1.0" encoding="utf-8"?>
-<a:theme xmlns:r="http://schemas.openxmlformats.org/officeDocument/2006/relationships" xmlns:c="http://schemas.openxmlformats.org/drawingml/2006/chart" xmlns:dgm="http://schemas.openxmlformats.org/drawingml/2006/diagram" xmlns:dsp="http://schemas.microsoft.com/office/drawing/2008/diagram" xmlns:a="http://schemas.openxmlformats.org/drawingml/2006/main" xmlns:pic="http://schemas.openxmlformats.org/drawingml/2006/picture" xmlns:wp="http://schemas.openxmlformats.org/drawingml/2006/wordprocessingDrawing" xmlns:xdr="http://schemas.openxmlformats.org/drawingml/2006/spreadsheetDrawing" xmlns:lc="http://schemas.openxmlformats.org/drawingml/2006/lockedCanvas" xmlns:p="http://schemas.openxmlformats.org/presentationml/2006/main" name="한컴오피스">
+<a:theme xmlns:a="http://schemas.openxmlformats.org/drawingml/2006/main" name="한컴오피스">
   <a:themeElements>
     <a:clrScheme name="한컴오피스">
       <a:dk1>
         <a:sysClr val="windowText" lastClr="000000"/>
       </a:dk1>
       <a:lt1>
-        <a:sysClr val="window" lastClr="ffffff"/>
+        <a:sysClr val="window" lastClr="FFFFFF"/>
       </a:lt1>
       <a:dk2>
-        <a:srgbClr val="3a3c84"/>
+        <a:srgbClr val="3A3C84"/>
       </a:dk2>
       <a:lt2>
-        <a:srgbClr val="faf3db"/>
+        <a:srgbClr val="FAF3DB"/>
       </a:lt2>
       <a:accent1>
-        <a:srgbClr val="6182d6"/>
+        <a:srgbClr val="6182D6"/>
       </a:accent1>
       <a:accent2>
-        <a:srgbClr val="ff843a"/>
+        <a:srgbClr val="FF843A"/>
       </a:accent2>
       <a:accent3>
-        <a:srgbClr val="b2b2b2"/>
+        <a:srgbClr val="B2B2B2"/>
       </a:accent3>
       <a:accent4>
-        <a:srgbClr val="ffd700"/>
+        <a:srgbClr val="FFD700"/>
       </a:accent4>
       <a:accent5>
-        <a:srgbClr val="289b6e"/>
+        <a:srgbClr val="289B6E"/>
       </a:accent5>
       <a:accent6>
-        <a:srgbClr val="9d5cbb"/>
+        <a:srgbClr val="9D5CBB"/>
       </a:accent6>
       <a:hlink>
-        <a:srgbClr val="0000ff"/>
+        <a:srgbClr val="0000FF"/>
       </a:hlink>
       <a:folHlink>
         <a:srgbClr val="800080"/>
@@ -4973,45 +5037,47 @@
       </a:bgFillStyleLst>
     </a:fmtScheme>
   </a:themeElements>
+  <a:objectDefaults/>
+  <a:extraClrSchemeLst/>
 </a:theme>
 </file>
 
 <file path=ppt/theme/theme2.xml><?xml version="1.0" encoding="utf-8"?>
-<a:theme xmlns:r="http://schemas.openxmlformats.org/officeDocument/2006/relationships" xmlns:c="http://schemas.openxmlformats.org/drawingml/2006/chart" xmlns:dgm="http://schemas.openxmlformats.org/drawingml/2006/diagram" xmlns:dsp="http://schemas.microsoft.com/office/drawing/2008/diagram" xmlns:a="http://schemas.openxmlformats.org/drawingml/2006/main" xmlns:pic="http://schemas.openxmlformats.org/drawingml/2006/picture" xmlns:wp="http://schemas.openxmlformats.org/drawingml/2006/wordprocessingDrawing" xmlns:xdr="http://schemas.openxmlformats.org/drawingml/2006/spreadsheetDrawing" xmlns:lc="http://schemas.openxmlformats.org/drawingml/2006/lockedCanvas" xmlns:p="http://schemas.openxmlformats.org/presentationml/2006/main" name="한컴오피스">
+<a:theme xmlns:a="http://schemas.openxmlformats.org/drawingml/2006/main" name="한컴오피스">
   <a:themeElements>
     <a:clrScheme name="한컴오피스">
       <a:dk1>
         <a:sysClr val="windowText" lastClr="000000"/>
       </a:dk1>
       <a:lt1>
-        <a:sysClr val="window" lastClr="ffffff"/>
+        <a:sysClr val="window" lastClr="FFFFFF"/>
       </a:lt1>
       <a:dk2>
-        <a:srgbClr val="3a3c84"/>
+        <a:srgbClr val="3A3C84"/>
       </a:dk2>
       <a:lt2>
-        <a:srgbClr val="faf3db"/>
+        <a:srgbClr val="FAF3DB"/>
       </a:lt2>
       <a:accent1>
-        <a:srgbClr val="6182d6"/>
+        <a:srgbClr val="6182D6"/>
       </a:accent1>
       <a:accent2>
-        <a:srgbClr val="ff843a"/>
+        <a:srgbClr val="FF843A"/>
       </a:accent2>
       <a:accent3>
-        <a:srgbClr val="b2b2b2"/>
+        <a:srgbClr val="B2B2B2"/>
       </a:accent3>
       <a:accent4>
-        <a:srgbClr val="ffd700"/>
+        <a:srgbClr val="FFD700"/>
       </a:accent4>
       <a:accent5>
-        <a:srgbClr val="289b6e"/>
+        <a:srgbClr val="289B6E"/>
       </a:accent5>
       <a:accent6>
-        <a:srgbClr val="9d5cbb"/>
+        <a:srgbClr val="9D5CBB"/>
       </a:accent6>
       <a:hlink>
-        <a:srgbClr val="0000ff"/>
+        <a:srgbClr val="0000FF"/>
       </a:hlink>
       <a:folHlink>
         <a:srgbClr val="800080"/>
@@ -5236,5 +5302,7 @@
       </a:bgFillStyleLst>
     </a:fmtScheme>
   </a:themeElements>
+  <a:objectDefaults/>
+  <a:extraClrSchemeLst/>
 </a:theme>
 </file>
</xml_diff>